<commit_message>
added a link to the course webpage
</commit_message>
<xml_diff>
--- a/course_intro.pptx
+++ b/course_intro.pptx
@@ -291,7 +291,7 @@
           <a:p>
             <a:fld id="{68EFDCB5-6D71-EB44-9F0A-D3622F5F58F7}" type="datetimeFigureOut">
               <a:rPr lang="en-US" smtClean="0"/>
-              <a:t>27/05/2013</a:t>
+              <a:t>28/07/2013</a:t>
             </a:fld>
             <a:endParaRPr lang="en-US"/>
           </a:p>
@@ -461,7 +461,7 @@
           <a:p>
             <a:fld id="{68EFDCB5-6D71-EB44-9F0A-D3622F5F58F7}" type="datetimeFigureOut">
               <a:rPr lang="en-US" smtClean="0"/>
-              <a:t>27/05/2013</a:t>
+              <a:t>28/07/2013</a:t>
             </a:fld>
             <a:endParaRPr lang="en-US"/>
           </a:p>
@@ -641,7 +641,7 @@
           <a:p>
             <a:fld id="{68EFDCB5-6D71-EB44-9F0A-D3622F5F58F7}" type="datetimeFigureOut">
               <a:rPr lang="en-US" smtClean="0"/>
-              <a:t>27/05/2013</a:t>
+              <a:t>28/07/2013</a:t>
             </a:fld>
             <a:endParaRPr lang="en-US"/>
           </a:p>
@@ -811,7 +811,7 @@
           <a:p>
             <a:fld id="{68EFDCB5-6D71-EB44-9F0A-D3622F5F58F7}" type="datetimeFigureOut">
               <a:rPr lang="en-US" smtClean="0"/>
-              <a:t>27/05/2013</a:t>
+              <a:t>28/07/2013</a:t>
             </a:fld>
             <a:endParaRPr lang="en-US"/>
           </a:p>
@@ -1057,7 +1057,7 @@
           <a:p>
             <a:fld id="{68EFDCB5-6D71-EB44-9F0A-D3622F5F58F7}" type="datetimeFigureOut">
               <a:rPr lang="en-US" smtClean="0"/>
-              <a:t>27/05/2013</a:t>
+              <a:t>28/07/2013</a:t>
             </a:fld>
             <a:endParaRPr lang="en-US"/>
           </a:p>
@@ -1345,7 +1345,7 @@
           <a:p>
             <a:fld id="{68EFDCB5-6D71-EB44-9F0A-D3622F5F58F7}" type="datetimeFigureOut">
               <a:rPr lang="en-US" smtClean="0"/>
-              <a:t>27/05/2013</a:t>
+              <a:t>28/07/2013</a:t>
             </a:fld>
             <a:endParaRPr lang="en-US"/>
           </a:p>
@@ -1767,7 +1767,7 @@
           <a:p>
             <a:fld id="{68EFDCB5-6D71-EB44-9F0A-D3622F5F58F7}" type="datetimeFigureOut">
               <a:rPr lang="en-US" smtClean="0"/>
-              <a:t>27/05/2013</a:t>
+              <a:t>28/07/2013</a:t>
             </a:fld>
             <a:endParaRPr lang="en-US"/>
           </a:p>
@@ -1885,7 +1885,7 @@
           <a:p>
             <a:fld id="{68EFDCB5-6D71-EB44-9F0A-D3622F5F58F7}" type="datetimeFigureOut">
               <a:rPr lang="en-US" smtClean="0"/>
-              <a:t>27/05/2013</a:t>
+              <a:t>28/07/2013</a:t>
             </a:fld>
             <a:endParaRPr lang="en-US"/>
           </a:p>
@@ -1980,7 +1980,7 @@
           <a:p>
             <a:fld id="{68EFDCB5-6D71-EB44-9F0A-D3622F5F58F7}" type="datetimeFigureOut">
               <a:rPr lang="en-US" smtClean="0"/>
-              <a:t>27/05/2013</a:t>
+              <a:t>28/07/2013</a:t>
             </a:fld>
             <a:endParaRPr lang="en-US"/>
           </a:p>
@@ -2257,7 +2257,7 @@
           <a:p>
             <a:fld id="{68EFDCB5-6D71-EB44-9F0A-D3622F5F58F7}" type="datetimeFigureOut">
               <a:rPr lang="en-US" smtClean="0"/>
-              <a:t>27/05/2013</a:t>
+              <a:t>28/07/2013</a:t>
             </a:fld>
             <a:endParaRPr lang="en-US"/>
           </a:p>
@@ -2510,7 +2510,7 @@
           <a:p>
             <a:fld id="{68EFDCB5-6D71-EB44-9F0A-D3622F5F58F7}" type="datetimeFigureOut">
               <a:rPr lang="en-US" smtClean="0"/>
-              <a:t>27/05/2013</a:t>
+              <a:t>28/07/2013</a:t>
             </a:fld>
             <a:endParaRPr lang="en-US"/>
           </a:p>
@@ -2723,7 +2723,7 @@
           <a:p>
             <a:fld id="{68EFDCB5-6D71-EB44-9F0A-D3622F5F58F7}" type="datetimeFigureOut">
               <a:rPr lang="en-US" smtClean="0"/>
-              <a:t>27/05/2013</a:t>
+              <a:t>28/07/2013</a:t>
             </a:fld>
             <a:endParaRPr lang="en-US"/>
           </a:p>
@@ -3139,49 +3139,39 @@
         </p:spPr>
         <p:txBody>
           <a:bodyPr>
-            <a:normAutofit fontScale="77500" lnSpcReduction="20000"/>
+            <a:normAutofit/>
           </a:bodyPr>
           <a:lstStyle/>
           <a:p>
             <a:r>
-              <a:rPr lang="en-US" dirty="0" smtClean="0"/>
-              <a:t>Tim Stevens, </a:t>
-            </a:r>
-            <a:r>
-              <a:rPr lang="en-US" dirty="0" err="1" smtClean="0"/>
-              <a:t>Babraham</a:t>
-            </a:r>
-            <a:r>
-              <a:rPr lang="en-US" dirty="0" smtClean="0"/>
-              <a:t> Institute</a:t>
-            </a:r>
-          </a:p>
-          <a:p>
-            <a:r>
-              <a:rPr lang="en-US" dirty="0" smtClean="0"/>
-              <a:t>Graham Ritchie, EMBL-EBI &amp; Sanger Institute</a:t>
-            </a:r>
-          </a:p>
-          <a:p>
-            <a:r>
-              <a:rPr lang="en-US" dirty="0" smtClean="0"/>
+              <a:rPr lang="en-US" sz="2600" dirty="0" smtClean="0"/>
+              <a:t>Graham </a:t>
+            </a:r>
+            <a:r>
+              <a:rPr lang="en-US" sz="2600" dirty="0" smtClean="0"/>
+              <a:t>Ritchie, EMBL-EBI &amp; Sanger Institute</a:t>
+            </a:r>
+          </a:p>
+          <a:p>
+            <a:r>
+              <a:rPr lang="en-US" sz="2600" dirty="0" smtClean="0"/>
               <a:t>Gabor </a:t>
             </a:r>
             <a:r>
-              <a:rPr lang="en-US" dirty="0" err="1" smtClean="0"/>
+              <a:rPr lang="en-US" sz="2600" dirty="0" err="1" smtClean="0"/>
               <a:t>Bunkoczi</a:t>
             </a:r>
             <a:r>
-              <a:rPr lang="en-US" dirty="0" smtClean="0"/>
+              <a:rPr lang="en-US" sz="2600" dirty="0" smtClean="0"/>
               <a:t>, CIMR, University of Cambridge</a:t>
             </a:r>
           </a:p>
           <a:p>
             <a:r>
-              <a:rPr lang="en-US" dirty="0" smtClean="0"/>
+              <a:rPr lang="en-US" sz="2600" dirty="0" smtClean="0"/>
               <a:t>James Morris, Sanger Institute</a:t>
             </a:r>
-            <a:endParaRPr lang="en-US" dirty="0"/>
+            <a:endParaRPr lang="en-US" sz="2600" dirty="0"/>
           </a:p>
         </p:txBody>
       </p:sp>
@@ -3513,7 +3503,7 @@
         <p:spPr/>
         <p:txBody>
           <a:bodyPr>
-            <a:normAutofit fontScale="92500"/>
+            <a:normAutofit/>
           </a:bodyPr>
           <a:lstStyle/>
           <a:p>
@@ -3524,7 +3514,7 @@
             </a:pPr>
             <a:r>
               <a:rPr lang="en-US" dirty="0" smtClean="0"/>
-              <a:t>You can follow along with the material for each of the four sections at the following URLs:</a:t>
+              <a:t>There is a course webpage with links to the materials, example solutions to the exercises etc.:</a:t>
             </a:r>
           </a:p>
           <a:p>
@@ -3534,66 +3524,12 @@
               </a:spcAft>
             </a:pPr>
             <a:r>
-              <a:rPr lang="en-US" dirty="0" smtClean="0">
+              <a:rPr lang="en-US" sz="3200" dirty="0" smtClean="0">
                 <a:hlinkClick r:id="rId2"/>
               </a:rPr>
-              <a:t>http://</a:t>
-            </a:r>
-            <a:r>
-              <a:rPr lang="en-US" dirty="0" err="1" smtClean="0">
-                <a:hlinkClick r:id="rId2"/>
-              </a:rPr>
-              <a:t>bit.ly</a:t>
-            </a:r>
-            <a:r>
-              <a:rPr lang="en-US" dirty="0" smtClean="0">
-                <a:hlinkClick r:id="rId2"/>
-              </a:rPr>
-              <a:t>/gslspython1</a:t>
-            </a:r>
-            <a:endParaRPr lang="en-US" dirty="0" smtClean="0"/>
-          </a:p>
-          <a:p>
-            <a:pPr lvl="1">
-              <a:spcAft>
-                <a:spcPts val="600"/>
-              </a:spcAft>
-            </a:pPr>
-            <a:r>
-              <a:rPr lang="en-US" dirty="0" smtClean="0">
-                <a:hlinkClick r:id="rId3"/>
-              </a:rPr>
-              <a:t>http://bit.ly/gslspython2</a:t>
-            </a:r>
-            <a:endParaRPr lang="en-US" dirty="0" smtClean="0"/>
-          </a:p>
-          <a:p>
-            <a:pPr lvl="1">
-              <a:spcAft>
-                <a:spcPts val="600"/>
-              </a:spcAft>
-            </a:pPr>
-            <a:r>
-              <a:rPr lang="en-US" dirty="0" smtClean="0">
-                <a:hlinkClick r:id="rId4"/>
-              </a:rPr>
-              <a:t>http://bit.ly/gslspython3</a:t>
-            </a:r>
-            <a:endParaRPr lang="en-US" dirty="0" smtClean="0"/>
-          </a:p>
-          <a:p>
-            <a:pPr lvl="1">
-              <a:spcAft>
-                <a:spcPts val="600"/>
-              </a:spcAft>
-            </a:pPr>
-            <a:r>
-              <a:rPr lang="en-US" dirty="0" smtClean="0">
-                <a:hlinkClick r:id="rId5"/>
-              </a:rPr>
-              <a:t>http://bit.ly/gslspython4</a:t>
-            </a:r>
-            <a:endParaRPr lang="en-US" dirty="0" smtClean="0"/>
+              <a:t>http://pycam.github.io</a:t>
+            </a:r>
+            <a:endParaRPr lang="en-US" sz="3200" dirty="0" smtClean="0"/>
           </a:p>
           <a:p>
             <a:pPr>
@@ -3603,7 +3539,26 @@
             </a:pPr>
             <a:r>
               <a:rPr lang="en-US" dirty="0" smtClean="0"/>
-              <a:t>NB: this material is still in development, feedback is welcome!</a:t>
+              <a:t>You are encouraged </a:t>
+            </a:r>
+            <a:r>
+              <a:rPr lang="en-US" dirty="0" smtClean="0"/>
+              <a:t>to follow along with the materials</a:t>
+            </a:r>
+          </a:p>
+          <a:p>
+            <a:pPr>
+              <a:spcAft>
+                <a:spcPts val="600"/>
+              </a:spcAft>
+            </a:pPr>
+            <a:r>
+              <a:rPr lang="en-US" dirty="0" smtClean="0"/>
+              <a:t>NB</a:t>
+            </a:r>
+            <a:r>
+              <a:rPr lang="en-US" dirty="0" smtClean="0"/>
+              <a:t>: this material is still in development, feedback is welcome!</a:t>
             </a:r>
           </a:p>
         </p:txBody>

</xml_diff>

<commit_message>
changes to sessions 3 & 4, simplified examples and exercises, added corresponding solutions and new data files
</commit_message>
<xml_diff>
--- a/course_intro.pptx
+++ b/course_intro.pptx
@@ -291,7 +291,7 @@
           <a:p>
             <a:fld id="{68EFDCB5-6D71-EB44-9F0A-D3622F5F58F7}" type="datetimeFigureOut">
               <a:rPr lang="en-US" smtClean="0"/>
-              <a:t>28/07/2013</a:t>
+              <a:t>29/07/2013</a:t>
             </a:fld>
             <a:endParaRPr lang="en-US"/>
           </a:p>
@@ -461,7 +461,7 @@
           <a:p>
             <a:fld id="{68EFDCB5-6D71-EB44-9F0A-D3622F5F58F7}" type="datetimeFigureOut">
               <a:rPr lang="en-US" smtClean="0"/>
-              <a:t>28/07/2013</a:t>
+              <a:t>29/07/2013</a:t>
             </a:fld>
             <a:endParaRPr lang="en-US"/>
           </a:p>
@@ -641,7 +641,7 @@
           <a:p>
             <a:fld id="{68EFDCB5-6D71-EB44-9F0A-D3622F5F58F7}" type="datetimeFigureOut">
               <a:rPr lang="en-US" smtClean="0"/>
-              <a:t>28/07/2013</a:t>
+              <a:t>29/07/2013</a:t>
             </a:fld>
             <a:endParaRPr lang="en-US"/>
           </a:p>
@@ -811,7 +811,7 @@
           <a:p>
             <a:fld id="{68EFDCB5-6D71-EB44-9F0A-D3622F5F58F7}" type="datetimeFigureOut">
               <a:rPr lang="en-US" smtClean="0"/>
-              <a:t>28/07/2013</a:t>
+              <a:t>29/07/2013</a:t>
             </a:fld>
             <a:endParaRPr lang="en-US"/>
           </a:p>
@@ -1057,7 +1057,7 @@
           <a:p>
             <a:fld id="{68EFDCB5-6D71-EB44-9F0A-D3622F5F58F7}" type="datetimeFigureOut">
               <a:rPr lang="en-US" smtClean="0"/>
-              <a:t>28/07/2013</a:t>
+              <a:t>29/07/2013</a:t>
             </a:fld>
             <a:endParaRPr lang="en-US"/>
           </a:p>
@@ -1345,7 +1345,7 @@
           <a:p>
             <a:fld id="{68EFDCB5-6D71-EB44-9F0A-D3622F5F58F7}" type="datetimeFigureOut">
               <a:rPr lang="en-US" smtClean="0"/>
-              <a:t>28/07/2013</a:t>
+              <a:t>29/07/2013</a:t>
             </a:fld>
             <a:endParaRPr lang="en-US"/>
           </a:p>
@@ -1767,7 +1767,7 @@
           <a:p>
             <a:fld id="{68EFDCB5-6D71-EB44-9F0A-D3622F5F58F7}" type="datetimeFigureOut">
               <a:rPr lang="en-US" smtClean="0"/>
-              <a:t>28/07/2013</a:t>
+              <a:t>29/07/2013</a:t>
             </a:fld>
             <a:endParaRPr lang="en-US"/>
           </a:p>
@@ -1885,7 +1885,7 @@
           <a:p>
             <a:fld id="{68EFDCB5-6D71-EB44-9F0A-D3622F5F58F7}" type="datetimeFigureOut">
               <a:rPr lang="en-US" smtClean="0"/>
-              <a:t>28/07/2013</a:t>
+              <a:t>29/07/2013</a:t>
             </a:fld>
             <a:endParaRPr lang="en-US"/>
           </a:p>
@@ -1980,7 +1980,7 @@
           <a:p>
             <a:fld id="{68EFDCB5-6D71-EB44-9F0A-D3622F5F58F7}" type="datetimeFigureOut">
               <a:rPr lang="en-US" smtClean="0"/>
-              <a:t>28/07/2013</a:t>
+              <a:t>29/07/2013</a:t>
             </a:fld>
             <a:endParaRPr lang="en-US"/>
           </a:p>
@@ -2257,7 +2257,7 @@
           <a:p>
             <a:fld id="{68EFDCB5-6D71-EB44-9F0A-D3622F5F58F7}" type="datetimeFigureOut">
               <a:rPr lang="en-US" smtClean="0"/>
-              <a:t>28/07/2013</a:t>
+              <a:t>29/07/2013</a:t>
             </a:fld>
             <a:endParaRPr lang="en-US"/>
           </a:p>
@@ -2510,7 +2510,7 @@
           <a:p>
             <a:fld id="{68EFDCB5-6D71-EB44-9F0A-D3622F5F58F7}" type="datetimeFigureOut">
               <a:rPr lang="en-US" smtClean="0"/>
-              <a:t>28/07/2013</a:t>
+              <a:t>29/07/2013</a:t>
             </a:fld>
             <a:endParaRPr lang="en-US"/>
           </a:p>
@@ -2723,7 +2723,7 @@
           <a:p>
             <a:fld id="{68EFDCB5-6D71-EB44-9F0A-D3622F5F58F7}" type="datetimeFigureOut">
               <a:rPr lang="en-US" smtClean="0"/>
-              <a:t>28/07/2013</a:t>
+              <a:t>29/07/2013</a:t>
             </a:fld>
             <a:endParaRPr lang="en-US"/>
           </a:p>
@@ -3139,37 +3139,51 @@
         </p:spPr>
         <p:txBody>
           <a:bodyPr>
-            <a:normAutofit/>
+            <a:normAutofit fontScale="92500" lnSpcReduction="10000"/>
           </a:bodyPr>
           <a:lstStyle/>
           <a:p>
             <a:r>
               <a:rPr lang="en-US" sz="2600" dirty="0" smtClean="0"/>
-              <a:t>Graham </a:t>
-            </a:r>
+              <a:t>Graham Ritchie, EMBL-EBI &amp; Sanger Institute</a:t>
+            </a:r>
+          </a:p>
+          <a:p>
             <a:r>
               <a:rPr lang="en-US" sz="2600" dirty="0" smtClean="0"/>
-              <a:t>Ritchie, EMBL-EBI &amp; Sanger Institute</a:t>
-            </a:r>
-          </a:p>
-          <a:p>
+              <a:t>James </a:t>
+            </a:r>
             <a:r>
               <a:rPr lang="en-US" sz="2600" dirty="0" smtClean="0"/>
-              <a:t>Gabor </a:t>
-            </a:r>
-            <a:r>
-              <a:rPr lang="en-US" sz="2600" dirty="0" err="1" smtClean="0"/>
-              <a:t>Bunkoczi</a:t>
+              <a:t>Morris, Sanger </a:t>
             </a:r>
             <a:r>
               <a:rPr lang="en-US" sz="2600" dirty="0" smtClean="0"/>
-              <a:t>, CIMR, University of Cambridge</a:t>
-            </a:r>
-          </a:p>
-          <a:p>
+              <a:t>Institute</a:t>
+            </a:r>
+          </a:p>
+          <a:p>
+            <a:r>
+              <a:rPr lang="en-US" sz="2600" smtClean="0"/>
+              <a:t>In</a:t>
+            </a:r>
+            <a:r>
+              <a:rPr lang="en-US" sz="2600" smtClean="0"/>
+              <a:t>ê</a:t>
+            </a:r>
+            <a:r>
+              <a:rPr lang="en-US" sz="2600" smtClean="0"/>
+              <a:t>s</a:t>
+            </a:r>
             <a:r>
               <a:rPr lang="en-US" sz="2600" dirty="0" smtClean="0"/>
-              <a:t>James Morris, Sanger Institute</a:t>
+              <a:t> de Santiago, CRUK</a:t>
+            </a:r>
+          </a:p>
+          <a:p>
+            <a:r>
+              <a:rPr lang="en-US" sz="2600" dirty="0" smtClean="0"/>
+              <a:t>Tom Carroll, CRUK </a:t>
             </a:r>
             <a:endParaRPr lang="en-US" sz="2600" dirty="0"/>
           </a:p>
@@ -3185,6 +3199,13 @@
   <p:clrMapOvr>
     <a:masterClrMapping/>
   </p:clrMapOvr>
+  <p:timing>
+    <p:tnLst>
+      <p:par>
+        <p:cTn xmlns:p14="http://schemas.microsoft.com/office/powerpoint/2010/main" id="1" dur="indefinite" restart="never" nodeType="tmRoot"/>
+      </p:par>
+    </p:tnLst>
+  </p:timing>
 </p:sld>
 </file>
 
@@ -3301,6 +3322,13 @@
   <p:clrMapOvr>
     <a:masterClrMapping/>
   </p:clrMapOvr>
+  <p:timing>
+    <p:tnLst>
+      <p:par>
+        <p:cTn xmlns:p14="http://schemas.microsoft.com/office/powerpoint/2010/main" id="1" dur="indefinite" restart="never" nodeType="tmRoot"/>
+      </p:par>
+    </p:tnLst>
+  </p:timing>
 </p:sld>
 </file>
 
@@ -3447,6 +3475,13 @@
   <p:clrMapOvr>
     <a:masterClrMapping/>
   </p:clrMapOvr>
+  <p:timing>
+    <p:tnLst>
+      <p:par>
+        <p:cTn xmlns:p14="http://schemas.microsoft.com/office/powerpoint/2010/main" id="1" dur="indefinite" restart="never" nodeType="tmRoot"/>
+      </p:par>
+    </p:tnLst>
+  </p:timing>
 </p:sld>
 </file>
 
@@ -3539,11 +3574,7 @@
             </a:pPr>
             <a:r>
               <a:rPr lang="en-US" dirty="0" smtClean="0"/>
-              <a:t>You are encouraged </a:t>
-            </a:r>
-            <a:r>
-              <a:rPr lang="en-US" dirty="0" smtClean="0"/>
-              <a:t>to follow along with the materials</a:t>
+              <a:t>You are encouraged to follow along with the materials</a:t>
             </a:r>
           </a:p>
           <a:p>
@@ -3554,11 +3585,7 @@
             </a:pPr>
             <a:r>
               <a:rPr lang="en-US" dirty="0" smtClean="0"/>
-              <a:t>NB</a:t>
-            </a:r>
-            <a:r>
-              <a:rPr lang="en-US" dirty="0" smtClean="0"/>
-              <a:t>: this material is still in development, feedback is welcome!</a:t>
+              <a:t>NB: this material is still in development, feedback is welcome!</a:t>
             </a:r>
           </a:p>
         </p:txBody>
@@ -3573,6 +3600,13 @@
   <p:clrMapOvr>
     <a:masterClrMapping/>
   </p:clrMapOvr>
+  <p:timing>
+    <p:tnLst>
+      <p:par>
+        <p:cTn xmlns:p14="http://schemas.microsoft.com/office/powerpoint/2010/main" id="1" dur="indefinite" restart="never" nodeType="tmRoot"/>
+      </p:par>
+    </p:tnLst>
+  </p:timing>
 </p:sld>
 </file>
 

</xml_diff>

<commit_message>
added list and tuple element numbering slide
</commit_message>
<xml_diff>
--- a/course_intro.pptx
+++ b/course_intro.pptx
@@ -5,7 +5,7 @@
     <p:sldMasterId id="2147483648" r:id="rId1"/>
   </p:sldMasterIdLst>
   <p:notesMasterIdLst>
-    <p:notesMasterId r:id="rId9"/>
+    <p:notesMasterId r:id="rId10"/>
   </p:notesMasterIdLst>
   <p:sldIdLst>
     <p:sldId id="256" r:id="rId2"/>
@@ -15,6 +15,7 @@
     <p:sldId id="260" r:id="rId6"/>
     <p:sldId id="261" r:id="rId7"/>
     <p:sldId id="262" r:id="rId8"/>
+    <p:sldId id="263" r:id="rId9"/>
   </p:sldIdLst>
   <p:sldSz cx="9144000" cy="6858000" type="screen4x3"/>
   <p:notesSz cx="6858000" cy="9144000"/>
@@ -198,7 +199,7 @@
           <a:p>
             <a:fld id="{4904B9C1-6A3D-4C13-A01D-A515624776C7}" type="datetimeFigureOut">
               <a:rPr lang="en-GB" smtClean="0"/>
-              <a:t>13/08/2013</a:t>
+              <a:t>11/09/2013</a:t>
             </a:fld>
             <a:endParaRPr lang="en-GB"/>
           </a:p>
@@ -366,6 +367,11 @@
         </p:txBody>
       </p:sp>
     </p:spTree>
+    <p:extLst>
+      <p:ext uri="{BB962C8B-B14F-4D97-AF65-F5344CB8AC3E}">
+        <p14:creationId xmlns:p14="http://schemas.microsoft.com/office/powerpoint/2010/main" val="356093076"/>
+      </p:ext>
+    </p:extLst>
   </p:cSld>
   <p:clrMap bg1="lt1" tx1="dk1" bg2="lt2" tx2="dk2" accent1="accent1" accent2="accent2" accent3="accent3" accent4="accent4" accent5="accent5" accent6="accent6" hlink="hlink" folHlink="folHlink"/>
   <p:notesStyle>
@@ -1212,7 +1218,7 @@
             <a:fld id="{68EFDCB5-6D71-EB44-9F0A-D3622F5F58F7}" type="datetimeFigureOut">
               <a:rPr lang="en-US" smtClean="0"/>
               <a:pPr/>
-              <a:t>8/13/2013</a:t>
+              <a:t>11/09/2013</a:t>
             </a:fld>
             <a:endParaRPr lang="en-US"/>
           </a:p>
@@ -1264,7 +1270,7 @@
     </p:spTree>
     <p:extLst>
       <p:ext uri="{BB962C8B-B14F-4D97-AF65-F5344CB8AC3E}">
-        <p14:creationId xmlns:p14="http://schemas.microsoft.com/office/powerpoint/2010/main" xmlns="" val="1824502421"/>
+        <p14:creationId xmlns:p14="http://schemas.microsoft.com/office/powerpoint/2010/main" val="1824502421"/>
       </p:ext>
     </p:extLst>
   </p:cSld>
@@ -1384,7 +1390,7 @@
             <a:fld id="{68EFDCB5-6D71-EB44-9F0A-D3622F5F58F7}" type="datetimeFigureOut">
               <a:rPr lang="en-US" smtClean="0"/>
               <a:pPr/>
-              <a:t>8/13/2013</a:t>
+              <a:t>11/09/2013</a:t>
             </a:fld>
             <a:endParaRPr lang="en-US"/>
           </a:p>
@@ -1436,7 +1442,7 @@
     </p:spTree>
     <p:extLst>
       <p:ext uri="{BB962C8B-B14F-4D97-AF65-F5344CB8AC3E}">
-        <p14:creationId xmlns:p14="http://schemas.microsoft.com/office/powerpoint/2010/main" xmlns="" val="3640608444"/>
+        <p14:creationId xmlns:p14="http://schemas.microsoft.com/office/powerpoint/2010/main" val="3640608444"/>
       </p:ext>
     </p:extLst>
   </p:cSld>
@@ -1566,7 +1572,7 @@
             <a:fld id="{68EFDCB5-6D71-EB44-9F0A-D3622F5F58F7}" type="datetimeFigureOut">
               <a:rPr lang="en-US" smtClean="0"/>
               <a:pPr/>
-              <a:t>8/13/2013</a:t>
+              <a:t>11/09/2013</a:t>
             </a:fld>
             <a:endParaRPr lang="en-US"/>
           </a:p>
@@ -1618,7 +1624,7 @@
     </p:spTree>
     <p:extLst>
       <p:ext uri="{BB962C8B-B14F-4D97-AF65-F5344CB8AC3E}">
-        <p14:creationId xmlns:p14="http://schemas.microsoft.com/office/powerpoint/2010/main" xmlns="" val="3071332235"/>
+        <p14:creationId xmlns:p14="http://schemas.microsoft.com/office/powerpoint/2010/main" val="3071332235"/>
       </p:ext>
     </p:extLst>
   </p:cSld>
@@ -1738,7 +1744,7 @@
             <a:fld id="{68EFDCB5-6D71-EB44-9F0A-D3622F5F58F7}" type="datetimeFigureOut">
               <a:rPr lang="en-US" smtClean="0"/>
               <a:pPr/>
-              <a:t>8/13/2013</a:t>
+              <a:t>11/09/2013</a:t>
             </a:fld>
             <a:endParaRPr lang="en-US"/>
           </a:p>
@@ -1790,7 +1796,7 @@
     </p:spTree>
     <p:extLst>
       <p:ext uri="{BB962C8B-B14F-4D97-AF65-F5344CB8AC3E}">
-        <p14:creationId xmlns:p14="http://schemas.microsoft.com/office/powerpoint/2010/main" xmlns="" val="2471939814"/>
+        <p14:creationId xmlns:p14="http://schemas.microsoft.com/office/powerpoint/2010/main" val="2471939814"/>
       </p:ext>
     </p:extLst>
   </p:cSld>
@@ -1986,7 +1992,7 @@
             <a:fld id="{68EFDCB5-6D71-EB44-9F0A-D3622F5F58F7}" type="datetimeFigureOut">
               <a:rPr lang="en-US" smtClean="0"/>
               <a:pPr/>
-              <a:t>8/13/2013</a:t>
+              <a:t>11/09/2013</a:t>
             </a:fld>
             <a:endParaRPr lang="en-US"/>
           </a:p>
@@ -2038,7 +2044,7 @@
     </p:spTree>
     <p:extLst>
       <p:ext uri="{BB962C8B-B14F-4D97-AF65-F5344CB8AC3E}">
-        <p14:creationId xmlns:p14="http://schemas.microsoft.com/office/powerpoint/2010/main" xmlns="" val="1787784368"/>
+        <p14:creationId xmlns:p14="http://schemas.microsoft.com/office/powerpoint/2010/main" val="1787784368"/>
       </p:ext>
     </p:extLst>
   </p:cSld>
@@ -2276,7 +2282,7 @@
             <a:fld id="{68EFDCB5-6D71-EB44-9F0A-D3622F5F58F7}" type="datetimeFigureOut">
               <a:rPr lang="en-US" smtClean="0"/>
               <a:pPr/>
-              <a:t>8/13/2013</a:t>
+              <a:t>11/09/2013</a:t>
             </a:fld>
             <a:endParaRPr lang="en-US"/>
           </a:p>
@@ -2328,7 +2334,7 @@
     </p:spTree>
     <p:extLst>
       <p:ext uri="{BB962C8B-B14F-4D97-AF65-F5344CB8AC3E}">
-        <p14:creationId xmlns:p14="http://schemas.microsoft.com/office/powerpoint/2010/main" xmlns="" val="770563960"/>
+        <p14:creationId xmlns:p14="http://schemas.microsoft.com/office/powerpoint/2010/main" val="770563960"/>
       </p:ext>
     </p:extLst>
   </p:cSld>
@@ -2700,7 +2706,7 @@
             <a:fld id="{68EFDCB5-6D71-EB44-9F0A-D3622F5F58F7}" type="datetimeFigureOut">
               <a:rPr lang="en-US" smtClean="0"/>
               <a:pPr/>
-              <a:t>8/13/2013</a:t>
+              <a:t>11/09/2013</a:t>
             </a:fld>
             <a:endParaRPr lang="en-US"/>
           </a:p>
@@ -2752,7 +2758,7 @@
     </p:spTree>
     <p:extLst>
       <p:ext uri="{BB962C8B-B14F-4D97-AF65-F5344CB8AC3E}">
-        <p14:creationId xmlns:p14="http://schemas.microsoft.com/office/powerpoint/2010/main" xmlns="" val="1816054316"/>
+        <p14:creationId xmlns:p14="http://schemas.microsoft.com/office/powerpoint/2010/main" val="1816054316"/>
       </p:ext>
     </p:extLst>
   </p:cSld>
@@ -2820,7 +2826,7 @@
             <a:fld id="{68EFDCB5-6D71-EB44-9F0A-D3622F5F58F7}" type="datetimeFigureOut">
               <a:rPr lang="en-US" smtClean="0"/>
               <a:pPr/>
-              <a:t>8/13/2013</a:t>
+              <a:t>11/09/2013</a:t>
             </a:fld>
             <a:endParaRPr lang="en-US"/>
           </a:p>
@@ -2872,7 +2878,7 @@
     </p:spTree>
     <p:extLst>
       <p:ext uri="{BB962C8B-B14F-4D97-AF65-F5344CB8AC3E}">
-        <p14:creationId xmlns:p14="http://schemas.microsoft.com/office/powerpoint/2010/main" xmlns="" val="462231512"/>
+        <p14:creationId xmlns:p14="http://schemas.microsoft.com/office/powerpoint/2010/main" val="462231512"/>
       </p:ext>
     </p:extLst>
   </p:cSld>
@@ -2917,7 +2923,7 @@
             <a:fld id="{68EFDCB5-6D71-EB44-9F0A-D3622F5F58F7}" type="datetimeFigureOut">
               <a:rPr lang="en-US" smtClean="0"/>
               <a:pPr/>
-              <a:t>8/13/2013</a:t>
+              <a:t>11/09/2013</a:t>
             </a:fld>
             <a:endParaRPr lang="en-US"/>
           </a:p>
@@ -2969,7 +2975,7 @@
     </p:spTree>
     <p:extLst>
       <p:ext uri="{BB962C8B-B14F-4D97-AF65-F5344CB8AC3E}">
-        <p14:creationId xmlns:p14="http://schemas.microsoft.com/office/powerpoint/2010/main" xmlns="" val="3456454501"/>
+        <p14:creationId xmlns:p14="http://schemas.microsoft.com/office/powerpoint/2010/main" val="3456454501"/>
       </p:ext>
     </p:extLst>
   </p:cSld>
@@ -3196,7 +3202,7 @@
             <a:fld id="{68EFDCB5-6D71-EB44-9F0A-D3622F5F58F7}" type="datetimeFigureOut">
               <a:rPr lang="en-US" smtClean="0"/>
               <a:pPr/>
-              <a:t>8/13/2013</a:t>
+              <a:t>11/09/2013</a:t>
             </a:fld>
             <a:endParaRPr lang="en-US"/>
           </a:p>
@@ -3248,7 +3254,7 @@
     </p:spTree>
     <p:extLst>
       <p:ext uri="{BB962C8B-B14F-4D97-AF65-F5344CB8AC3E}">
-        <p14:creationId xmlns:p14="http://schemas.microsoft.com/office/powerpoint/2010/main" xmlns="" val="1394508752"/>
+        <p14:creationId xmlns:p14="http://schemas.microsoft.com/office/powerpoint/2010/main" val="1394508752"/>
       </p:ext>
     </p:extLst>
   </p:cSld>
@@ -3451,7 +3457,7 @@
             <a:fld id="{68EFDCB5-6D71-EB44-9F0A-D3622F5F58F7}" type="datetimeFigureOut">
               <a:rPr lang="en-US" smtClean="0"/>
               <a:pPr/>
-              <a:t>8/13/2013</a:t>
+              <a:t>11/09/2013</a:t>
             </a:fld>
             <a:endParaRPr lang="en-US"/>
           </a:p>
@@ -3503,7 +3509,7 @@
     </p:spTree>
     <p:extLst>
       <p:ext uri="{BB962C8B-B14F-4D97-AF65-F5344CB8AC3E}">
-        <p14:creationId xmlns:p14="http://schemas.microsoft.com/office/powerpoint/2010/main" xmlns="" val="682945760"/>
+        <p14:creationId xmlns:p14="http://schemas.microsoft.com/office/powerpoint/2010/main" val="682945760"/>
       </p:ext>
     </p:extLst>
   </p:cSld>
@@ -3666,7 +3672,7 @@
             <a:fld id="{68EFDCB5-6D71-EB44-9F0A-D3622F5F58F7}" type="datetimeFigureOut">
               <a:rPr lang="en-US" smtClean="0"/>
               <a:pPr/>
-              <a:t>8/13/2013</a:t>
+              <a:t>11/09/2013</a:t>
             </a:fld>
             <a:endParaRPr lang="en-US"/>
           </a:p>
@@ -3754,7 +3760,7 @@
     </p:spTree>
     <p:extLst>
       <p:ext uri="{BB962C8B-B14F-4D97-AF65-F5344CB8AC3E}">
-        <p14:creationId xmlns:p14="http://schemas.microsoft.com/office/powerpoint/2010/main" xmlns="" val="637499351"/>
+        <p14:creationId xmlns:p14="http://schemas.microsoft.com/office/powerpoint/2010/main" val="637499351"/>
       </p:ext>
     </p:extLst>
   </p:cSld>
@@ -4120,7 +4126,7 @@
     </p:spTree>
     <p:extLst>
       <p:ext uri="{BB962C8B-B14F-4D97-AF65-F5344CB8AC3E}">
-        <p14:creationId xmlns:p14="http://schemas.microsoft.com/office/powerpoint/2010/main" xmlns="" val="2309513282"/>
+        <p14:creationId xmlns:p14="http://schemas.microsoft.com/office/powerpoint/2010/main" val="2309513282"/>
       </p:ext>
     </p:extLst>
   </p:cSld>
@@ -4130,7 +4136,7 @@
   <p:timing>
     <p:tnLst>
       <p:par>
-        <p:cTn id="1" dur="indefinite" restart="never" nodeType="tmRoot"/>
+        <p:cTn xmlns:p14="http://schemas.microsoft.com/office/powerpoint/2010/main" id="1" dur="indefinite" restart="never" nodeType="tmRoot"/>
       </p:par>
     </p:tnLst>
   </p:timing>
@@ -4243,7 +4249,7 @@
     </p:spTree>
     <p:extLst>
       <p:ext uri="{BB962C8B-B14F-4D97-AF65-F5344CB8AC3E}">
-        <p14:creationId xmlns:p14="http://schemas.microsoft.com/office/powerpoint/2010/main" xmlns="" val="1586397150"/>
+        <p14:creationId xmlns:p14="http://schemas.microsoft.com/office/powerpoint/2010/main" val="1586397150"/>
       </p:ext>
     </p:extLst>
   </p:cSld>
@@ -4253,7 +4259,7 @@
   <p:timing>
     <p:tnLst>
       <p:par>
-        <p:cTn id="1" dur="indefinite" restart="never" nodeType="tmRoot"/>
+        <p:cTn xmlns:p14="http://schemas.microsoft.com/office/powerpoint/2010/main" id="1" dur="indefinite" restart="never" nodeType="tmRoot"/>
       </p:par>
     </p:tnLst>
   </p:timing>
@@ -4396,7 +4402,7 @@
     </p:spTree>
     <p:extLst>
       <p:ext uri="{BB962C8B-B14F-4D97-AF65-F5344CB8AC3E}">
-        <p14:creationId xmlns:p14="http://schemas.microsoft.com/office/powerpoint/2010/main" xmlns="" val="1462945205"/>
+        <p14:creationId xmlns:p14="http://schemas.microsoft.com/office/powerpoint/2010/main" val="1462945205"/>
       </p:ext>
     </p:extLst>
   </p:cSld>
@@ -4406,7 +4412,7 @@
   <p:timing>
     <p:tnLst>
       <p:par>
-        <p:cTn id="1" dur="indefinite" restart="never" nodeType="tmRoot"/>
+        <p:cTn xmlns:p14="http://schemas.microsoft.com/office/powerpoint/2010/main" id="1" dur="indefinite" restart="never" nodeType="tmRoot"/>
       </p:par>
     </p:tnLst>
   </p:timing>
@@ -4521,7 +4527,7 @@
     </p:spTree>
     <p:extLst>
       <p:ext uri="{BB962C8B-B14F-4D97-AF65-F5344CB8AC3E}">
-        <p14:creationId xmlns:p14="http://schemas.microsoft.com/office/powerpoint/2010/main" xmlns="" val="2325491196"/>
+        <p14:creationId xmlns:p14="http://schemas.microsoft.com/office/powerpoint/2010/main" val="2325491196"/>
       </p:ext>
     </p:extLst>
   </p:cSld>
@@ -4531,7 +4537,7 @@
   <p:timing>
     <p:tnLst>
       <p:par>
-        <p:cTn id="1" dur="indefinite" restart="never" nodeType="tmRoot"/>
+        <p:cTn xmlns:p14="http://schemas.microsoft.com/office/powerpoint/2010/main" id="1" dur="indefinite" restart="never" nodeType="tmRoot"/>
       </p:par>
     </p:tnLst>
   </p:timing>
@@ -5307,7 +5313,7 @@
   <p:timing>
     <p:tnLst>
       <p:par>
-        <p:cTn id="1" dur="indefinite" restart="never" nodeType="tmRoot">
+        <p:cTn xmlns:p14="http://schemas.microsoft.com/office/powerpoint/2010/main" id="1" dur="indefinite" restart="never" nodeType="tmRoot">
           <p:childTnLst>
             <p:seq concurrent="1" nextAc="seek">
               <p:cTn id="2" dur="indefinite" nodeType="mainSeq">
@@ -6176,11 +6182,7 @@
             <a:pPr algn="ctr"/>
             <a:r>
               <a:rPr lang="en-GB" sz="2800" dirty="0" smtClean="0"/>
-              <a:t>y</a:t>
-            </a:r>
-            <a:r>
-              <a:rPr lang="en-GB" sz="2800" dirty="0" smtClean="0"/>
-              <a:t> = 5</a:t>
+              <a:t>y = 5</a:t>
             </a:r>
             <a:endParaRPr lang="en-GB" sz="2800" dirty="0"/>
           </a:p>
@@ -6822,7 +6824,7 @@
   <p:timing>
     <p:tnLst>
       <p:par>
-        <p:cTn id="1" dur="indefinite" restart="never" nodeType="tmRoot">
+        <p:cTn xmlns:p14="http://schemas.microsoft.com/office/powerpoint/2010/main" id="1" dur="indefinite" restart="never" nodeType="tmRoot">
           <p:childTnLst>
             <p:seq concurrent="1" nextAc="seek">
               <p:cTn id="2" dur="indefinite" nodeType="mainSeq">
@@ -8036,7 +8038,7 @@
   <p:timing>
     <p:tnLst>
       <p:par>
-        <p:cTn id="1" dur="indefinite" restart="never" nodeType="tmRoot">
+        <p:cTn xmlns:p14="http://schemas.microsoft.com/office/powerpoint/2010/main" id="1" dur="indefinite" restart="never" nodeType="tmRoot">
           <p:childTnLst>
             <p:seq concurrent="1" nextAc="seek">
               <p:cTn id="2" dur="indefinite" nodeType="mainSeq">
@@ -8324,6 +8326,929 @@
       <p:bldP spid="45" grpId="0" animBg="1"/>
       <p:bldP spid="46" grpId="0" animBg="1"/>
     </p:bldLst>
+  </p:timing>
+</p:sld>
+</file>
+
+<file path=ppt/slides/slide8.xml><?xml version="1.0" encoding="utf-8"?>
+<p:sld xmlns:a="http://schemas.openxmlformats.org/drawingml/2006/main" xmlns:r="http://schemas.openxmlformats.org/officeDocument/2006/relationships" xmlns:p="http://schemas.openxmlformats.org/presentationml/2006/main">
+  <p:cSld>
+    <p:spTree>
+      <p:nvGrpSpPr>
+        <p:cNvPr id="1" name=""/>
+        <p:cNvGrpSpPr/>
+        <p:nvPr/>
+      </p:nvGrpSpPr>
+      <p:grpSpPr>
+        <a:xfrm>
+          <a:off x="0" y="0"/>
+          <a:ext cx="0" cy="0"/>
+          <a:chOff x="0" y="0"/>
+          <a:chExt cx="0" cy="0"/>
+        </a:xfrm>
+      </p:grpSpPr>
+      <p:graphicFrame>
+        <p:nvGraphicFramePr>
+          <p:cNvPr id="7" name="Table 6"/>
+          <p:cNvGraphicFramePr>
+            <a:graphicFrameLocks noGrp="1"/>
+          </p:cNvGraphicFramePr>
+          <p:nvPr>
+            <p:extLst>
+              <p:ext uri="{D42A27DB-BD31-4B8C-83A1-F6EECF244321}">
+                <p14:modId xmlns:p14="http://schemas.microsoft.com/office/powerpoint/2010/main" val="978799440"/>
+              </p:ext>
+            </p:extLst>
+          </p:nvPr>
+        </p:nvGraphicFramePr>
+        <p:xfrm>
+          <a:off x="1524000" y="2238123"/>
+          <a:ext cx="6096000" cy="1371600"/>
+        </p:xfrm>
+        <a:graphic>
+          <a:graphicData uri="http://schemas.openxmlformats.org/drawingml/2006/table">
+            <a:tbl>
+              <a:tblPr firstRow="1" bandRow="1">
+                <a:tableStyleId>{2D5ABB26-0587-4C30-8999-92F81FD0307C}</a:tableStyleId>
+              </a:tblPr>
+              <a:tblGrid>
+                <a:gridCol w="1016000"/>
+                <a:gridCol w="1016000"/>
+                <a:gridCol w="1016000"/>
+                <a:gridCol w="1016000"/>
+                <a:gridCol w="1016000"/>
+                <a:gridCol w="1016000"/>
+              </a:tblGrid>
+              <a:tr h="0">
+                <a:tc>
+                  <a:txBody>
+                    <a:bodyPr/>
+                    <a:lstStyle/>
+                    <a:p>
+                      <a:r>
+                        <a:rPr lang="en-US" dirty="0" smtClean="0"/>
+                        <a:t>Index</a:t>
+                      </a:r>
+                    </a:p>
+                  </a:txBody>
+                  <a:tcPr>
+                    <a:lnL w="12700" cap="flat" cmpd="sng" algn="ctr">
+                      <a:noFill/>
+                      <a:prstDash val="solid"/>
+                      <a:round/>
+                      <a:headEnd type="none" w="med" len="med"/>
+                      <a:tailEnd type="none" w="med" len="med"/>
+                    </a:lnL>
+                    <a:lnT w="12700" cap="flat" cmpd="sng" algn="ctr">
+                      <a:noFill/>
+                      <a:prstDash val="solid"/>
+                      <a:round/>
+                      <a:headEnd type="none" w="med" len="med"/>
+                      <a:tailEnd type="none" w="med" len="med"/>
+                    </a:lnT>
+                    <a:lnB w="19050" cap="flat" cmpd="sng" algn="ctr">
+                      <a:solidFill>
+                        <a:prstClr val="black"/>
+                      </a:solidFill>
+                      <a:prstDash val="solid"/>
+                      <a:round/>
+                      <a:headEnd type="none" w="med" len="med"/>
+                      <a:tailEnd type="none" w="med" len="med"/>
+                    </a:lnB>
+                  </a:tcPr>
+                </a:tc>
+                <a:tc>
+                  <a:txBody>
+                    <a:bodyPr/>
+                    <a:lstStyle/>
+                    <a:p>
+                      <a:pPr algn="ctr"/>
+                      <a:r>
+                        <a:rPr lang="en-US" dirty="0" smtClean="0"/>
+                        <a:t>0</a:t>
+                      </a:r>
+                      <a:endParaRPr lang="en-US" dirty="0"/>
+                    </a:p>
+                  </a:txBody>
+                  <a:tcPr anchor="ctr">
+                    <a:lnT w="12700" cap="flat" cmpd="sng" algn="ctr">
+                      <a:noFill/>
+                      <a:prstDash val="solid"/>
+                      <a:round/>
+                      <a:headEnd type="none" w="med" len="med"/>
+                      <a:tailEnd type="none" w="med" len="med"/>
+                    </a:lnT>
+                    <a:lnB w="19050" cap="flat" cmpd="sng" algn="ctr">
+                      <a:solidFill>
+                        <a:prstClr val="black"/>
+                      </a:solidFill>
+                      <a:prstDash val="solid"/>
+                      <a:round/>
+                      <a:headEnd type="none" w="med" len="med"/>
+                      <a:tailEnd type="none" w="med" len="med"/>
+                    </a:lnB>
+                  </a:tcPr>
+                </a:tc>
+                <a:tc>
+                  <a:txBody>
+                    <a:bodyPr/>
+                    <a:lstStyle/>
+                    <a:p>
+                      <a:pPr algn="ctr"/>
+                      <a:r>
+                        <a:rPr lang="en-US" dirty="0" smtClean="0"/>
+                        <a:t>1</a:t>
+                      </a:r>
+                      <a:endParaRPr lang="en-US" dirty="0"/>
+                    </a:p>
+                  </a:txBody>
+                  <a:tcPr anchor="ctr">
+                    <a:lnT w="12700" cap="flat" cmpd="sng" algn="ctr">
+                      <a:noFill/>
+                      <a:prstDash val="solid"/>
+                      <a:round/>
+                      <a:headEnd type="none" w="med" len="med"/>
+                      <a:tailEnd type="none" w="med" len="med"/>
+                    </a:lnT>
+                    <a:lnB w="19050" cap="flat" cmpd="sng" algn="ctr">
+                      <a:solidFill>
+                        <a:prstClr val="black"/>
+                      </a:solidFill>
+                      <a:prstDash val="solid"/>
+                      <a:round/>
+                      <a:headEnd type="none" w="med" len="med"/>
+                      <a:tailEnd type="none" w="med" len="med"/>
+                    </a:lnB>
+                  </a:tcPr>
+                </a:tc>
+                <a:tc>
+                  <a:txBody>
+                    <a:bodyPr/>
+                    <a:lstStyle/>
+                    <a:p>
+                      <a:pPr algn="ctr"/>
+                      <a:r>
+                        <a:rPr lang="en-US" dirty="0" smtClean="0"/>
+                        <a:t>2</a:t>
+                      </a:r>
+                      <a:endParaRPr lang="en-US" dirty="0"/>
+                    </a:p>
+                  </a:txBody>
+                  <a:tcPr anchor="ctr">
+                    <a:lnT w="12700" cap="flat" cmpd="sng" algn="ctr">
+                      <a:noFill/>
+                      <a:prstDash val="solid"/>
+                      <a:round/>
+                      <a:headEnd type="none" w="med" len="med"/>
+                      <a:tailEnd type="none" w="med" len="med"/>
+                    </a:lnT>
+                    <a:lnB w="19050" cap="flat" cmpd="sng" algn="ctr">
+                      <a:solidFill>
+                        <a:prstClr val="black"/>
+                      </a:solidFill>
+                      <a:prstDash val="solid"/>
+                      <a:round/>
+                      <a:headEnd type="none" w="med" len="med"/>
+                      <a:tailEnd type="none" w="med" len="med"/>
+                    </a:lnB>
+                  </a:tcPr>
+                </a:tc>
+                <a:tc>
+                  <a:txBody>
+                    <a:bodyPr/>
+                    <a:lstStyle/>
+                    <a:p>
+                      <a:pPr algn="ctr"/>
+                      <a:r>
+                        <a:rPr lang="en-US" dirty="0" smtClean="0"/>
+                        <a:t>3</a:t>
+                      </a:r>
+                      <a:endParaRPr lang="en-US" dirty="0"/>
+                    </a:p>
+                  </a:txBody>
+                  <a:tcPr anchor="ctr">
+                    <a:lnT w="12700" cap="flat" cmpd="sng" algn="ctr">
+                      <a:noFill/>
+                      <a:prstDash val="solid"/>
+                      <a:round/>
+                      <a:headEnd type="none" w="med" len="med"/>
+                      <a:tailEnd type="none" w="med" len="med"/>
+                    </a:lnT>
+                    <a:lnB w="19050" cap="flat" cmpd="sng" algn="ctr">
+                      <a:solidFill>
+                        <a:prstClr val="black"/>
+                      </a:solidFill>
+                      <a:prstDash val="solid"/>
+                      <a:round/>
+                      <a:headEnd type="none" w="med" len="med"/>
+                      <a:tailEnd type="none" w="med" len="med"/>
+                    </a:lnB>
+                  </a:tcPr>
+                </a:tc>
+                <a:tc>
+                  <a:txBody>
+                    <a:bodyPr/>
+                    <a:lstStyle/>
+                    <a:p>
+                      <a:pPr algn="ctr"/>
+                      <a:r>
+                        <a:rPr lang="en-US" dirty="0" smtClean="0"/>
+                        <a:t>4</a:t>
+                      </a:r>
+                      <a:endParaRPr lang="en-US" dirty="0"/>
+                    </a:p>
+                  </a:txBody>
+                  <a:tcPr anchor="ctr">
+                    <a:lnR w="12700" cap="flat" cmpd="sng" algn="ctr">
+                      <a:noFill/>
+                      <a:prstDash val="solid"/>
+                      <a:round/>
+                      <a:headEnd type="none" w="med" len="med"/>
+                      <a:tailEnd type="none" w="med" len="med"/>
+                    </a:lnR>
+                    <a:lnT w="12700" cap="flat" cmpd="sng" algn="ctr">
+                      <a:noFill/>
+                      <a:prstDash val="solid"/>
+                      <a:round/>
+                      <a:headEnd type="none" w="med" len="med"/>
+                      <a:tailEnd type="none" w="med" len="med"/>
+                    </a:lnT>
+                    <a:lnB w="19050" cap="flat" cmpd="sng" algn="ctr">
+                      <a:solidFill>
+                        <a:prstClr val="black"/>
+                      </a:solidFill>
+                      <a:prstDash val="solid"/>
+                      <a:round/>
+                      <a:headEnd type="none" w="med" len="med"/>
+                      <a:tailEnd type="none" w="med" len="med"/>
+                    </a:lnB>
+                  </a:tcPr>
+                </a:tc>
+              </a:tr>
+              <a:tr h="0">
+                <a:tc>
+                  <a:txBody>
+                    <a:bodyPr/>
+                    <a:lstStyle/>
+                    <a:p>
+                      <a:r>
+                        <a:rPr lang="en-US" dirty="0" smtClean="0"/>
+                        <a:t>Element</a:t>
+                      </a:r>
+                      <a:endParaRPr lang="en-US" dirty="0"/>
+                    </a:p>
+                  </a:txBody>
+                  <a:tcPr>
+                    <a:lnL w="19050" cap="flat" cmpd="sng" algn="ctr">
+                      <a:solidFill>
+                        <a:prstClr val="black"/>
+                      </a:solidFill>
+                      <a:prstDash val="solid"/>
+                      <a:round/>
+                      <a:headEnd type="none" w="med" len="med"/>
+                      <a:tailEnd type="none" w="med" len="med"/>
+                    </a:lnL>
+                    <a:lnR w="19050" cap="flat" cmpd="sng" algn="ctr">
+                      <a:solidFill>
+                        <a:prstClr val="black"/>
+                      </a:solidFill>
+                      <a:prstDash val="solid"/>
+                      <a:round/>
+                      <a:headEnd type="none" w="med" len="med"/>
+                      <a:tailEnd type="none" w="med" len="med"/>
+                    </a:lnR>
+                    <a:lnT w="19050" cap="flat" cmpd="sng" algn="ctr">
+                      <a:solidFill>
+                        <a:prstClr val="black"/>
+                      </a:solidFill>
+                      <a:prstDash val="solid"/>
+                      <a:round/>
+                      <a:headEnd type="none" w="med" len="med"/>
+                      <a:tailEnd type="none" w="med" len="med"/>
+                    </a:lnT>
+                    <a:lnB w="19050" cap="flat" cmpd="sng" algn="ctr">
+                      <a:solidFill>
+                        <a:prstClr val="black"/>
+                      </a:solidFill>
+                      <a:prstDash val="solid"/>
+                      <a:round/>
+                      <a:headEnd type="none" w="med" len="med"/>
+                      <a:tailEnd type="none" w="med" len="med"/>
+                    </a:lnB>
+                  </a:tcPr>
+                </a:tc>
+                <a:tc>
+                  <a:txBody>
+                    <a:bodyPr/>
+                    <a:lstStyle/>
+                    <a:p>
+                      <a:pPr algn="ctr"/>
+                      <a:r>
+                        <a:rPr lang="en-US" dirty="0" smtClean="0"/>
+                        <a:t>123</a:t>
+                      </a:r>
+                      <a:endParaRPr lang="en-US" dirty="0"/>
+                    </a:p>
+                  </a:txBody>
+                  <a:tcPr anchor="ctr">
+                    <a:lnL w="19050" cap="flat" cmpd="sng" algn="ctr">
+                      <a:solidFill>
+                        <a:prstClr val="black"/>
+                      </a:solidFill>
+                      <a:prstDash val="solid"/>
+                      <a:round/>
+                      <a:headEnd type="none" w="med" len="med"/>
+                      <a:tailEnd type="none" w="med" len="med"/>
+                    </a:lnL>
+                    <a:lnR w="19050" cap="flat" cmpd="sng" algn="ctr">
+                      <a:solidFill>
+                        <a:prstClr val="black"/>
+                      </a:solidFill>
+                      <a:prstDash val="solid"/>
+                      <a:round/>
+                      <a:headEnd type="none" w="med" len="med"/>
+                      <a:tailEnd type="none" w="med" len="med"/>
+                    </a:lnR>
+                    <a:lnT w="19050" cap="flat" cmpd="sng" algn="ctr">
+                      <a:solidFill>
+                        <a:prstClr val="black"/>
+                      </a:solidFill>
+                      <a:prstDash val="solid"/>
+                      <a:round/>
+                      <a:headEnd type="none" w="med" len="med"/>
+                      <a:tailEnd type="none" w="med" len="med"/>
+                    </a:lnT>
+                    <a:lnB w="19050" cap="flat" cmpd="sng" algn="ctr">
+                      <a:solidFill>
+                        <a:prstClr val="black"/>
+                      </a:solidFill>
+                      <a:prstDash val="solid"/>
+                      <a:round/>
+                      <a:headEnd type="none" w="med" len="med"/>
+                      <a:tailEnd type="none" w="med" len="med"/>
+                    </a:lnB>
+                  </a:tcPr>
+                </a:tc>
+                <a:tc>
+                  <a:txBody>
+                    <a:bodyPr/>
+                    <a:lstStyle/>
+                    <a:p>
+                      <a:pPr algn="ctr"/>
+                      <a:r>
+                        <a:rPr lang="en-US" dirty="0" smtClean="0"/>
+                        <a:t>54</a:t>
+                      </a:r>
+                      <a:endParaRPr lang="en-US" dirty="0"/>
+                    </a:p>
+                  </a:txBody>
+                  <a:tcPr anchor="ctr">
+                    <a:lnL w="19050" cap="flat" cmpd="sng" algn="ctr">
+                      <a:solidFill>
+                        <a:prstClr val="black"/>
+                      </a:solidFill>
+                      <a:prstDash val="solid"/>
+                      <a:round/>
+                      <a:headEnd type="none" w="med" len="med"/>
+                      <a:tailEnd type="none" w="med" len="med"/>
+                    </a:lnL>
+                    <a:lnR w="19050" cap="flat" cmpd="sng" algn="ctr">
+                      <a:solidFill>
+                        <a:prstClr val="black"/>
+                      </a:solidFill>
+                      <a:prstDash val="solid"/>
+                      <a:round/>
+                      <a:headEnd type="none" w="med" len="med"/>
+                      <a:tailEnd type="none" w="med" len="med"/>
+                    </a:lnR>
+                    <a:lnT w="19050" cap="flat" cmpd="sng" algn="ctr">
+                      <a:solidFill>
+                        <a:prstClr val="black"/>
+                      </a:solidFill>
+                      <a:prstDash val="solid"/>
+                      <a:round/>
+                      <a:headEnd type="none" w="med" len="med"/>
+                      <a:tailEnd type="none" w="med" len="med"/>
+                    </a:lnT>
+                    <a:lnB w="19050" cap="flat" cmpd="sng" algn="ctr">
+                      <a:solidFill>
+                        <a:prstClr val="black"/>
+                      </a:solidFill>
+                      <a:prstDash val="solid"/>
+                      <a:round/>
+                      <a:headEnd type="none" w="med" len="med"/>
+                      <a:tailEnd type="none" w="med" len="med"/>
+                    </a:lnB>
+                  </a:tcPr>
+                </a:tc>
+                <a:tc>
+                  <a:txBody>
+                    <a:bodyPr/>
+                    <a:lstStyle/>
+                    <a:p>
+                      <a:pPr algn="ctr"/>
+                      <a:r>
+                        <a:rPr lang="en-US" dirty="0" smtClean="0"/>
+                        <a:t>92</a:t>
+                      </a:r>
+                      <a:endParaRPr lang="en-US" dirty="0"/>
+                    </a:p>
+                  </a:txBody>
+                  <a:tcPr anchor="ctr">
+                    <a:lnL w="19050" cap="flat" cmpd="sng" algn="ctr">
+                      <a:solidFill>
+                        <a:prstClr val="black"/>
+                      </a:solidFill>
+                      <a:prstDash val="solid"/>
+                      <a:round/>
+                      <a:headEnd type="none" w="med" len="med"/>
+                      <a:tailEnd type="none" w="med" len="med"/>
+                    </a:lnL>
+                    <a:lnR w="19050" cap="flat" cmpd="sng" algn="ctr">
+                      <a:solidFill>
+                        <a:prstClr val="black"/>
+                      </a:solidFill>
+                      <a:prstDash val="solid"/>
+                      <a:round/>
+                      <a:headEnd type="none" w="med" len="med"/>
+                      <a:tailEnd type="none" w="med" len="med"/>
+                    </a:lnR>
+                    <a:lnT w="19050" cap="flat" cmpd="sng" algn="ctr">
+                      <a:solidFill>
+                        <a:prstClr val="black"/>
+                      </a:solidFill>
+                      <a:prstDash val="solid"/>
+                      <a:round/>
+                      <a:headEnd type="none" w="med" len="med"/>
+                      <a:tailEnd type="none" w="med" len="med"/>
+                    </a:lnT>
+                    <a:lnB w="19050" cap="flat" cmpd="sng" algn="ctr">
+                      <a:solidFill>
+                        <a:prstClr val="black"/>
+                      </a:solidFill>
+                      <a:prstDash val="solid"/>
+                      <a:round/>
+                      <a:headEnd type="none" w="med" len="med"/>
+                      <a:tailEnd type="none" w="med" len="med"/>
+                    </a:lnB>
+                  </a:tcPr>
+                </a:tc>
+                <a:tc>
+                  <a:txBody>
+                    <a:bodyPr/>
+                    <a:lstStyle/>
+                    <a:p>
+                      <a:pPr algn="ctr"/>
+                      <a:r>
+                        <a:rPr lang="en-US" dirty="0" smtClean="0"/>
+                        <a:t>87</a:t>
+                      </a:r>
+                      <a:endParaRPr lang="en-US" dirty="0"/>
+                    </a:p>
+                  </a:txBody>
+                  <a:tcPr anchor="ctr">
+                    <a:lnL w="19050" cap="flat" cmpd="sng" algn="ctr">
+                      <a:solidFill>
+                        <a:prstClr val="black"/>
+                      </a:solidFill>
+                      <a:prstDash val="solid"/>
+                      <a:round/>
+                      <a:headEnd type="none" w="med" len="med"/>
+                      <a:tailEnd type="none" w="med" len="med"/>
+                    </a:lnL>
+                    <a:lnR w="19050" cap="flat" cmpd="sng" algn="ctr">
+                      <a:solidFill>
+                        <a:prstClr val="black"/>
+                      </a:solidFill>
+                      <a:prstDash val="solid"/>
+                      <a:round/>
+                      <a:headEnd type="none" w="med" len="med"/>
+                      <a:tailEnd type="none" w="med" len="med"/>
+                    </a:lnR>
+                    <a:lnT w="19050" cap="flat" cmpd="sng" algn="ctr">
+                      <a:solidFill>
+                        <a:prstClr val="black"/>
+                      </a:solidFill>
+                      <a:prstDash val="solid"/>
+                      <a:round/>
+                      <a:headEnd type="none" w="med" len="med"/>
+                      <a:tailEnd type="none" w="med" len="med"/>
+                    </a:lnT>
+                    <a:lnB w="19050" cap="flat" cmpd="sng" algn="ctr">
+                      <a:solidFill>
+                        <a:prstClr val="black"/>
+                      </a:solidFill>
+                      <a:prstDash val="solid"/>
+                      <a:round/>
+                      <a:headEnd type="none" w="med" len="med"/>
+                      <a:tailEnd type="none" w="med" len="med"/>
+                    </a:lnB>
+                  </a:tcPr>
+                </a:tc>
+                <a:tc>
+                  <a:txBody>
+                    <a:bodyPr/>
+                    <a:lstStyle/>
+                    <a:p>
+                      <a:pPr algn="ctr"/>
+                      <a:r>
+                        <a:rPr lang="en-US" dirty="0" smtClean="0"/>
+                        <a:t>33</a:t>
+                      </a:r>
+                      <a:endParaRPr lang="en-US" dirty="0"/>
+                    </a:p>
+                  </a:txBody>
+                  <a:tcPr anchor="ctr">
+                    <a:lnL w="19050" cap="flat" cmpd="sng" algn="ctr">
+                      <a:solidFill>
+                        <a:prstClr val="black"/>
+                      </a:solidFill>
+                      <a:prstDash val="solid"/>
+                      <a:round/>
+                      <a:headEnd type="none" w="med" len="med"/>
+                      <a:tailEnd type="none" w="med" len="med"/>
+                    </a:lnL>
+                    <a:lnR w="19050" cap="flat" cmpd="sng" algn="ctr">
+                      <a:solidFill>
+                        <a:prstClr val="black"/>
+                      </a:solidFill>
+                      <a:prstDash val="solid"/>
+                      <a:round/>
+                      <a:headEnd type="none" w="med" len="med"/>
+                      <a:tailEnd type="none" w="med" len="med"/>
+                    </a:lnR>
+                    <a:lnT w="19050" cap="flat" cmpd="sng" algn="ctr">
+                      <a:solidFill>
+                        <a:prstClr val="black"/>
+                      </a:solidFill>
+                      <a:prstDash val="solid"/>
+                      <a:round/>
+                      <a:headEnd type="none" w="med" len="med"/>
+                      <a:tailEnd type="none" w="med" len="med"/>
+                    </a:lnT>
+                    <a:lnB w="19050" cap="flat" cmpd="sng" algn="ctr">
+                      <a:solidFill>
+                        <a:prstClr val="black"/>
+                      </a:solidFill>
+                      <a:prstDash val="solid"/>
+                      <a:round/>
+                      <a:headEnd type="none" w="med" len="med"/>
+                      <a:tailEnd type="none" w="med" len="med"/>
+                    </a:lnB>
+                  </a:tcPr>
+                </a:tc>
+              </a:tr>
+              <a:tr h="0">
+                <a:tc>
+                  <a:txBody>
+                    <a:bodyPr/>
+                    <a:lstStyle/>
+                    <a:p>
+                      <a:r>
+                        <a:rPr lang="en-US" dirty="0" smtClean="0"/>
+                        <a:t>Negative Index</a:t>
+                      </a:r>
+                      <a:endParaRPr lang="en-US" dirty="0"/>
+                    </a:p>
+                  </a:txBody>
+                  <a:tcPr>
+                    <a:lnL w="12700" cap="flat" cmpd="sng" algn="ctr">
+                      <a:noFill/>
+                      <a:prstDash val="solid"/>
+                      <a:round/>
+                      <a:headEnd type="none" w="med" len="med"/>
+                      <a:tailEnd type="none" w="med" len="med"/>
+                    </a:lnL>
+                    <a:lnT w="19050" cap="flat" cmpd="sng" algn="ctr">
+                      <a:solidFill>
+                        <a:prstClr val="black"/>
+                      </a:solidFill>
+                      <a:prstDash val="solid"/>
+                      <a:round/>
+                      <a:headEnd type="none" w="med" len="med"/>
+                      <a:tailEnd type="none" w="med" len="med"/>
+                    </a:lnT>
+                    <a:lnB w="12700" cap="flat" cmpd="sng" algn="ctr">
+                      <a:noFill/>
+                      <a:prstDash val="solid"/>
+                      <a:round/>
+                      <a:headEnd type="none" w="med" len="med"/>
+                      <a:tailEnd type="none" w="med" len="med"/>
+                    </a:lnB>
+                  </a:tcPr>
+                </a:tc>
+                <a:tc>
+                  <a:txBody>
+                    <a:bodyPr/>
+                    <a:lstStyle/>
+                    <a:p>
+                      <a:pPr algn="ctr"/>
+                      <a:r>
+                        <a:rPr lang="en-US" dirty="0" smtClean="0"/>
+                        <a:t>-5</a:t>
+                      </a:r>
+                      <a:endParaRPr lang="en-US" dirty="0"/>
+                    </a:p>
+                  </a:txBody>
+                  <a:tcPr anchor="ctr">
+                    <a:lnT w="19050" cap="flat" cmpd="sng" algn="ctr">
+                      <a:solidFill>
+                        <a:prstClr val="black"/>
+                      </a:solidFill>
+                      <a:prstDash val="solid"/>
+                      <a:round/>
+                      <a:headEnd type="none" w="med" len="med"/>
+                      <a:tailEnd type="none" w="med" len="med"/>
+                    </a:lnT>
+                    <a:lnB w="12700" cap="flat" cmpd="sng" algn="ctr">
+                      <a:noFill/>
+                      <a:prstDash val="solid"/>
+                      <a:round/>
+                      <a:headEnd type="none" w="med" len="med"/>
+                      <a:tailEnd type="none" w="med" len="med"/>
+                    </a:lnB>
+                  </a:tcPr>
+                </a:tc>
+                <a:tc>
+                  <a:txBody>
+                    <a:bodyPr/>
+                    <a:lstStyle/>
+                    <a:p>
+                      <a:pPr algn="ctr"/>
+                      <a:r>
+                        <a:rPr lang="en-US" dirty="0" smtClean="0"/>
+                        <a:t>-4</a:t>
+                      </a:r>
+                      <a:endParaRPr lang="en-US" dirty="0"/>
+                    </a:p>
+                  </a:txBody>
+                  <a:tcPr anchor="ctr">
+                    <a:lnT w="19050" cap="flat" cmpd="sng" algn="ctr">
+                      <a:solidFill>
+                        <a:prstClr val="black"/>
+                      </a:solidFill>
+                      <a:prstDash val="solid"/>
+                      <a:round/>
+                      <a:headEnd type="none" w="med" len="med"/>
+                      <a:tailEnd type="none" w="med" len="med"/>
+                    </a:lnT>
+                    <a:lnB w="12700" cap="flat" cmpd="sng" algn="ctr">
+                      <a:noFill/>
+                      <a:prstDash val="solid"/>
+                      <a:round/>
+                      <a:headEnd type="none" w="med" len="med"/>
+                      <a:tailEnd type="none" w="med" len="med"/>
+                    </a:lnB>
+                  </a:tcPr>
+                </a:tc>
+                <a:tc>
+                  <a:txBody>
+                    <a:bodyPr/>
+                    <a:lstStyle/>
+                    <a:p>
+                      <a:pPr algn="ctr"/>
+                      <a:r>
+                        <a:rPr lang="en-US" dirty="0" smtClean="0"/>
+                        <a:t>-3</a:t>
+                      </a:r>
+                      <a:endParaRPr lang="en-US" dirty="0"/>
+                    </a:p>
+                  </a:txBody>
+                  <a:tcPr anchor="ctr">
+                    <a:lnT w="19050" cap="flat" cmpd="sng" algn="ctr">
+                      <a:solidFill>
+                        <a:prstClr val="black"/>
+                      </a:solidFill>
+                      <a:prstDash val="solid"/>
+                      <a:round/>
+                      <a:headEnd type="none" w="med" len="med"/>
+                      <a:tailEnd type="none" w="med" len="med"/>
+                    </a:lnT>
+                    <a:lnB w="12700" cap="flat" cmpd="sng" algn="ctr">
+                      <a:noFill/>
+                      <a:prstDash val="solid"/>
+                      <a:round/>
+                      <a:headEnd type="none" w="med" len="med"/>
+                      <a:tailEnd type="none" w="med" len="med"/>
+                    </a:lnB>
+                  </a:tcPr>
+                </a:tc>
+                <a:tc>
+                  <a:txBody>
+                    <a:bodyPr/>
+                    <a:lstStyle/>
+                    <a:p>
+                      <a:pPr algn="ctr"/>
+                      <a:r>
+                        <a:rPr lang="en-US" dirty="0" smtClean="0"/>
+                        <a:t>-2</a:t>
+                      </a:r>
+                      <a:endParaRPr lang="en-US" dirty="0"/>
+                    </a:p>
+                  </a:txBody>
+                  <a:tcPr anchor="ctr">
+                    <a:lnT w="19050" cap="flat" cmpd="sng" algn="ctr">
+                      <a:solidFill>
+                        <a:prstClr val="black"/>
+                      </a:solidFill>
+                      <a:prstDash val="solid"/>
+                      <a:round/>
+                      <a:headEnd type="none" w="med" len="med"/>
+                      <a:tailEnd type="none" w="med" len="med"/>
+                    </a:lnT>
+                    <a:lnB w="12700" cap="flat" cmpd="sng" algn="ctr">
+                      <a:noFill/>
+                      <a:prstDash val="solid"/>
+                      <a:round/>
+                      <a:headEnd type="none" w="med" len="med"/>
+                      <a:tailEnd type="none" w="med" len="med"/>
+                    </a:lnB>
+                  </a:tcPr>
+                </a:tc>
+                <a:tc>
+                  <a:txBody>
+                    <a:bodyPr/>
+                    <a:lstStyle/>
+                    <a:p>
+                      <a:pPr algn="ctr"/>
+                      <a:r>
+                        <a:rPr lang="en-US" dirty="0" smtClean="0"/>
+                        <a:t>-1</a:t>
+                      </a:r>
+                      <a:endParaRPr lang="en-US" dirty="0"/>
+                    </a:p>
+                  </a:txBody>
+                  <a:tcPr anchor="ctr">
+                    <a:lnR w="12700" cap="flat" cmpd="sng" algn="ctr">
+                      <a:noFill/>
+                      <a:prstDash val="solid"/>
+                      <a:round/>
+                      <a:headEnd type="none" w="med" len="med"/>
+                      <a:tailEnd type="none" w="med" len="med"/>
+                    </a:lnR>
+                    <a:lnT w="19050" cap="flat" cmpd="sng" algn="ctr">
+                      <a:solidFill>
+                        <a:prstClr val="black"/>
+                      </a:solidFill>
+                      <a:prstDash val="solid"/>
+                      <a:round/>
+                      <a:headEnd type="none" w="med" len="med"/>
+                      <a:tailEnd type="none" w="med" len="med"/>
+                    </a:lnT>
+                    <a:lnB w="12700" cap="flat" cmpd="sng" algn="ctr">
+                      <a:noFill/>
+                      <a:prstDash val="solid"/>
+                      <a:round/>
+                      <a:headEnd type="none" w="med" len="med"/>
+                      <a:tailEnd type="none" w="med" len="med"/>
+                    </a:lnB>
+                  </a:tcPr>
+                </a:tc>
+              </a:tr>
+            </a:tbl>
+          </a:graphicData>
+        </a:graphic>
+      </p:graphicFrame>
+      <p:sp>
+        <p:nvSpPr>
+          <p:cNvPr id="9" name="TextBox 8"/>
+          <p:cNvSpPr txBox="1"/>
+          <p:nvPr/>
+        </p:nvSpPr>
+        <p:spPr>
+          <a:xfrm>
+            <a:off x="1524000" y="1665609"/>
+            <a:ext cx="3950895" cy="369332"/>
+          </a:xfrm>
+          <a:prstGeom prst="rect">
+            <a:avLst/>
+          </a:prstGeom>
+          <a:noFill/>
+        </p:spPr>
+        <p:txBody>
+          <a:bodyPr wrap="square" rtlCol="0">
+            <a:spAutoFit/>
+          </a:bodyPr>
+          <a:lstStyle/>
+          <a:p>
+            <a:r>
+              <a:rPr lang="en-US" dirty="0"/>
+              <a:t>x</a:t>
+            </a:r>
+            <a:r>
+              <a:rPr lang="en-US" dirty="0" smtClean="0"/>
+              <a:t> =  [123, 54, 92, 87, 33]</a:t>
+            </a:r>
+            <a:endParaRPr lang="en-US" dirty="0"/>
+          </a:p>
+        </p:txBody>
+      </p:sp>
+      <p:cxnSp>
+        <p:nvCxnSpPr>
+          <p:cNvPr id="12" name="Straight Arrow Connector 11"/>
+          <p:cNvCxnSpPr/>
+          <p:nvPr/>
+        </p:nvCxnSpPr>
+        <p:spPr>
+          <a:xfrm flipV="1">
+            <a:off x="2667000" y="3857625"/>
+            <a:ext cx="4953000" cy="15875"/>
+          </a:xfrm>
+          <a:prstGeom prst="straightConnector1">
+            <a:avLst/>
+          </a:prstGeom>
+          <a:ln>
+            <a:solidFill>
+              <a:schemeClr val="tx1"/>
+            </a:solidFill>
+            <a:headEnd type="arrow"/>
+            <a:tailEnd type="arrow"/>
+          </a:ln>
+        </p:spPr>
+        <p:style>
+          <a:lnRef idx="2">
+            <a:schemeClr val="accent1"/>
+          </a:lnRef>
+          <a:fillRef idx="0">
+            <a:schemeClr val="accent1"/>
+          </a:fillRef>
+          <a:effectRef idx="1">
+            <a:schemeClr val="accent1"/>
+          </a:effectRef>
+          <a:fontRef idx="minor">
+            <a:schemeClr val="tx1"/>
+          </a:fontRef>
+        </p:style>
+      </p:cxnSp>
+      <p:sp>
+        <p:nvSpPr>
+          <p:cNvPr id="13" name="TextBox 12"/>
+          <p:cNvSpPr txBox="1"/>
+          <p:nvPr/>
+        </p:nvSpPr>
+        <p:spPr>
+          <a:xfrm>
+            <a:off x="4413250" y="3932793"/>
+            <a:ext cx="1515446" cy="369332"/>
+          </a:xfrm>
+          <a:prstGeom prst="rect">
+            <a:avLst/>
+          </a:prstGeom>
+          <a:noFill/>
+        </p:spPr>
+        <p:txBody>
+          <a:bodyPr wrap="none" rtlCol="0">
+            <a:spAutoFit/>
+          </a:bodyPr>
+          <a:lstStyle/>
+          <a:p>
+            <a:r>
+              <a:rPr lang="en-US" dirty="0" smtClean="0"/>
+              <a:t>List length is 5</a:t>
+            </a:r>
+            <a:endParaRPr lang="en-US" dirty="0"/>
+          </a:p>
+        </p:txBody>
+      </p:sp>
+      <p:sp>
+        <p:nvSpPr>
+          <p:cNvPr id="14" name="Title 13"/>
+          <p:cNvSpPr>
+            <a:spLocks noGrp="1"/>
+          </p:cNvSpPr>
+          <p:nvPr>
+            <p:ph type="title"/>
+          </p:nvPr>
+        </p:nvSpPr>
+        <p:spPr/>
+        <p:txBody>
+          <a:bodyPr/>
+          <a:lstStyle/>
+          <a:p>
+            <a:r>
+              <a:rPr lang="en-US" dirty="0" smtClean="0"/>
+              <a:t>Tuple and List element numbering</a:t>
+            </a:r>
+            <a:endParaRPr lang="en-US" dirty="0"/>
+          </a:p>
+        </p:txBody>
+      </p:sp>
+    </p:spTree>
+    <p:extLst>
+      <p:ext uri="{BB962C8B-B14F-4D97-AF65-F5344CB8AC3E}">
+        <p14:creationId xmlns:p14="http://schemas.microsoft.com/office/powerpoint/2010/main" val="2092343012"/>
+      </p:ext>
+    </p:extLst>
+  </p:cSld>
+  <p:clrMapOvr>
+    <a:masterClrMapping/>
+  </p:clrMapOvr>
+  <p:timing>
+    <p:tnLst>
+      <p:par>
+        <p:cTn xmlns:p14="http://schemas.microsoft.com/office/powerpoint/2010/main" id="1" dur="indefinite" restart="never" nodeType="tmRoot"/>
+      </p:par>
+    </p:tnLst>
   </p:timing>
 </p:sld>
 </file>

</xml_diff>

<commit_message>
add more intro slides, update installation instructions for VM
</commit_message>
<xml_diff>
--- a/course_intro.pptx
+++ b/course_intro.pptx
@@ -5,17 +5,22 @@
     <p:sldMasterId id="2147483648" r:id="rId1"/>
   </p:sldMasterIdLst>
   <p:notesMasterIdLst>
-    <p:notesMasterId r:id="rId10"/>
+    <p:notesMasterId r:id="rId15"/>
   </p:notesMasterIdLst>
   <p:sldIdLst>
     <p:sldId id="256" r:id="rId2"/>
     <p:sldId id="257" r:id="rId3"/>
     <p:sldId id="258" r:id="rId4"/>
     <p:sldId id="259" r:id="rId5"/>
-    <p:sldId id="260" r:id="rId6"/>
-    <p:sldId id="261" r:id="rId7"/>
-    <p:sldId id="262" r:id="rId8"/>
-    <p:sldId id="263" r:id="rId9"/>
+    <p:sldId id="264" r:id="rId6"/>
+    <p:sldId id="265" r:id="rId7"/>
+    <p:sldId id="266" r:id="rId8"/>
+    <p:sldId id="267" r:id="rId9"/>
+    <p:sldId id="268" r:id="rId10"/>
+    <p:sldId id="260" r:id="rId11"/>
+    <p:sldId id="261" r:id="rId12"/>
+    <p:sldId id="262" r:id="rId13"/>
+    <p:sldId id="263" r:id="rId14"/>
   </p:sldIdLst>
   <p:sldSz cx="9144000" cy="6858000" type="screen4x3"/>
   <p:notesSz cx="6858000" cy="9144000"/>
@@ -199,7 +204,7 @@
           <a:p>
             <a:fld id="{4904B9C1-6A3D-4C13-A01D-A515624776C7}" type="datetimeFigureOut">
               <a:rPr lang="en-GB" smtClean="0"/>
-              <a:t>11/09/2013</a:t>
+              <a:t>14/12/15</a:t>
             </a:fld>
             <a:endParaRPr lang="en-GB"/>
           </a:p>
@@ -515,7 +520,7 @@
           </a:bodyPr>
           <a:lstStyle/>
           <a:p>
-            <a:endParaRPr lang="en-GB"/>
+            <a:endParaRPr lang="en-GB" dirty="0"/>
           </a:p>
         </p:txBody>
       </p:sp>
@@ -860,7 +865,7 @@
           <a:p>
             <a:fld id="{4DFE0EF5-62D5-461F-8112-FF137DBB53DA}" type="slidenum">
               <a:rPr lang="en-GB" smtClean="0"/>
-              <a:t>5</a:t>
+              <a:t>10</a:t>
             </a:fld>
             <a:endParaRPr lang="en-GB"/>
           </a:p>
@@ -941,7 +946,7 @@
           <a:p>
             <a:fld id="{4DFE0EF5-62D5-461F-8112-FF137DBB53DA}" type="slidenum">
               <a:rPr lang="en-GB" smtClean="0"/>
-              <a:t>6</a:t>
+              <a:t>11</a:t>
             </a:fld>
             <a:endParaRPr lang="en-GB"/>
           </a:p>
@@ -1022,7 +1027,7 @@
           <a:p>
             <a:fld id="{4DFE0EF5-62D5-461F-8112-FF137DBB53DA}" type="slidenum">
               <a:rPr lang="en-GB" smtClean="0"/>
-              <a:t>7</a:t>
+              <a:t>12</a:t>
             </a:fld>
             <a:endParaRPr lang="en-GB"/>
           </a:p>
@@ -1218,7 +1223,7 @@
             <a:fld id="{68EFDCB5-6D71-EB44-9F0A-D3622F5F58F7}" type="datetimeFigureOut">
               <a:rPr lang="en-US" smtClean="0"/>
               <a:pPr/>
-              <a:t>11/09/2013</a:t>
+              <a:t>14/12/15</a:t>
             </a:fld>
             <a:endParaRPr lang="en-US"/>
           </a:p>
@@ -1390,7 +1395,7 @@
             <a:fld id="{68EFDCB5-6D71-EB44-9F0A-D3622F5F58F7}" type="datetimeFigureOut">
               <a:rPr lang="en-US" smtClean="0"/>
               <a:pPr/>
-              <a:t>11/09/2013</a:t>
+              <a:t>14/12/15</a:t>
             </a:fld>
             <a:endParaRPr lang="en-US"/>
           </a:p>
@@ -1572,7 +1577,7 @@
             <a:fld id="{68EFDCB5-6D71-EB44-9F0A-D3622F5F58F7}" type="datetimeFigureOut">
               <a:rPr lang="en-US" smtClean="0"/>
               <a:pPr/>
-              <a:t>11/09/2013</a:t>
+              <a:t>14/12/15</a:t>
             </a:fld>
             <a:endParaRPr lang="en-US"/>
           </a:p>
@@ -1744,7 +1749,7 @@
             <a:fld id="{68EFDCB5-6D71-EB44-9F0A-D3622F5F58F7}" type="datetimeFigureOut">
               <a:rPr lang="en-US" smtClean="0"/>
               <a:pPr/>
-              <a:t>11/09/2013</a:t>
+              <a:t>14/12/15</a:t>
             </a:fld>
             <a:endParaRPr lang="en-US"/>
           </a:p>
@@ -1992,7 +1997,7 @@
             <a:fld id="{68EFDCB5-6D71-EB44-9F0A-D3622F5F58F7}" type="datetimeFigureOut">
               <a:rPr lang="en-US" smtClean="0"/>
               <a:pPr/>
-              <a:t>11/09/2013</a:t>
+              <a:t>14/12/15</a:t>
             </a:fld>
             <a:endParaRPr lang="en-US"/>
           </a:p>
@@ -2282,7 +2287,7 @@
             <a:fld id="{68EFDCB5-6D71-EB44-9F0A-D3622F5F58F7}" type="datetimeFigureOut">
               <a:rPr lang="en-US" smtClean="0"/>
               <a:pPr/>
-              <a:t>11/09/2013</a:t>
+              <a:t>14/12/15</a:t>
             </a:fld>
             <a:endParaRPr lang="en-US"/>
           </a:p>
@@ -2706,7 +2711,7 @@
             <a:fld id="{68EFDCB5-6D71-EB44-9F0A-D3622F5F58F7}" type="datetimeFigureOut">
               <a:rPr lang="en-US" smtClean="0"/>
               <a:pPr/>
-              <a:t>11/09/2013</a:t>
+              <a:t>14/12/15</a:t>
             </a:fld>
             <a:endParaRPr lang="en-US"/>
           </a:p>
@@ -2826,7 +2831,7 @@
             <a:fld id="{68EFDCB5-6D71-EB44-9F0A-D3622F5F58F7}" type="datetimeFigureOut">
               <a:rPr lang="en-US" smtClean="0"/>
               <a:pPr/>
-              <a:t>11/09/2013</a:t>
+              <a:t>14/12/15</a:t>
             </a:fld>
             <a:endParaRPr lang="en-US"/>
           </a:p>
@@ -2923,7 +2928,7 @@
             <a:fld id="{68EFDCB5-6D71-EB44-9F0A-D3622F5F58F7}" type="datetimeFigureOut">
               <a:rPr lang="en-US" smtClean="0"/>
               <a:pPr/>
-              <a:t>11/09/2013</a:t>
+              <a:t>14/12/15</a:t>
             </a:fld>
             <a:endParaRPr lang="en-US"/>
           </a:p>
@@ -3202,7 +3207,7 @@
             <a:fld id="{68EFDCB5-6D71-EB44-9F0A-D3622F5F58F7}" type="datetimeFigureOut">
               <a:rPr lang="en-US" smtClean="0"/>
               <a:pPr/>
-              <a:t>11/09/2013</a:t>
+              <a:t>14/12/15</a:t>
             </a:fld>
             <a:endParaRPr lang="en-US"/>
           </a:p>
@@ -3457,7 +3462,7 @@
             <a:fld id="{68EFDCB5-6D71-EB44-9F0A-D3622F5F58F7}" type="datetimeFigureOut">
               <a:rPr lang="en-US" smtClean="0"/>
               <a:pPr/>
-              <a:t>11/09/2013</a:t>
+              <a:t>14/12/15</a:t>
             </a:fld>
             <a:endParaRPr lang="en-US"/>
           </a:p>
@@ -3672,7 +3677,7 @@
             <a:fld id="{68EFDCB5-6D71-EB44-9F0A-D3622F5F58F7}" type="datetimeFigureOut">
               <a:rPr lang="en-US" smtClean="0"/>
               <a:pPr/>
-              <a:t>11/09/2013</a:t>
+              <a:t>14/12/15</a:t>
             </a:fld>
             <a:endParaRPr lang="en-US"/>
           </a:p>
@@ -4083,43 +4088,61 @@
         </p:nvSpPr>
         <p:spPr>
           <a:xfrm>
-            <a:off x="1244600" y="4025900"/>
-            <a:ext cx="6654800" cy="1752600"/>
+            <a:off x="685801" y="4025900"/>
+            <a:ext cx="7772400" cy="1752600"/>
           </a:xfrm>
         </p:spPr>
         <p:txBody>
-          <a:bodyPr>
-            <a:normAutofit fontScale="92500" lnSpcReduction="10000"/>
+          <a:bodyPr anchor="b">
+            <a:normAutofit/>
           </a:bodyPr>
           <a:lstStyle/>
           <a:p>
             <a:r>
-              <a:rPr lang="en-US" sz="2600" dirty="0" smtClean="0"/>
-              <a:t>Graham Ritchie, EMBL-EBI &amp; Sanger Institute</a:t>
-            </a:r>
-          </a:p>
-          <a:p>
-            <a:r>
-              <a:rPr lang="en-US" sz="2600" dirty="0" smtClean="0"/>
-              <a:t>James Morris, Sanger Institute</a:t>
-            </a:r>
-          </a:p>
-          <a:p>
-            <a:r>
-              <a:rPr lang="en-US" sz="2600" smtClean="0"/>
-              <a:t>Inês</a:t>
-            </a:r>
-            <a:r>
-              <a:rPr lang="en-US" sz="2600" dirty="0" smtClean="0"/>
-              <a:t> de Santiago, CRUK</a:t>
-            </a:r>
-          </a:p>
-          <a:p>
-            <a:r>
-              <a:rPr lang="en-US" sz="2600" dirty="0" smtClean="0"/>
-              <a:t>Tom Carroll, CRUK </a:t>
-            </a:r>
-            <a:endParaRPr lang="en-US" sz="2600" dirty="0"/>
+              <a:rPr lang="en-US" sz="2000" dirty="0" smtClean="0"/>
+              <a:t>Gordon Brown</a:t>
+            </a:r>
+            <a:r>
+              <a:rPr lang="en-US" sz="2000" dirty="0"/>
+              <a:t>, CRUK Cambridge </a:t>
+            </a:r>
+            <a:r>
+              <a:rPr lang="en-US" sz="2000" dirty="0" smtClean="0"/>
+              <a:t>Institute</a:t>
+            </a:r>
+          </a:p>
+          <a:p>
+            <a:r>
+              <a:rPr lang="en-US" sz="2000" dirty="0"/>
+              <a:t>Henry </a:t>
+            </a:r>
+            <a:r>
+              <a:rPr lang="en-US" sz="2000" dirty="0" err="1" smtClean="0"/>
+              <a:t>Farmery</a:t>
+            </a:r>
+            <a:r>
+              <a:rPr lang="en-US" sz="2000" dirty="0" smtClean="0"/>
+              <a:t>, </a:t>
+            </a:r>
+            <a:r>
+              <a:rPr lang="en-US" sz="2000" dirty="0"/>
+              <a:t>CRUK Cambridge Institute</a:t>
+            </a:r>
+            <a:endParaRPr lang="en-US" sz="2000" dirty="0" smtClean="0"/>
+          </a:p>
+          <a:p>
+            <a:r>
+              <a:rPr lang="en-US" sz="2000" dirty="0" smtClean="0"/>
+              <a:t>Anne </a:t>
+            </a:r>
+            <a:r>
+              <a:rPr lang="en-US" sz="2000" dirty="0" err="1" smtClean="0"/>
+              <a:t>Pajon</a:t>
+            </a:r>
+            <a:r>
+              <a:rPr lang="en-US" sz="2000" dirty="0"/>
+              <a:t>, CRUK Cambridge Institute</a:t>
+            </a:r>
           </a:p>
         </p:txBody>
       </p:sp>
@@ -4143,408 +4166,7 @@
 </p:sld>
 </file>
 
-<file path=ppt/slides/slide2.xml><?xml version="1.0" encoding="utf-8"?>
-<p:sld xmlns:a="http://schemas.openxmlformats.org/drawingml/2006/main" xmlns:r="http://schemas.openxmlformats.org/officeDocument/2006/relationships" xmlns:p="http://schemas.openxmlformats.org/presentationml/2006/main">
-  <p:cSld>
-    <p:spTree>
-      <p:nvGrpSpPr>
-        <p:cNvPr id="1" name=""/>
-        <p:cNvGrpSpPr/>
-        <p:nvPr/>
-      </p:nvGrpSpPr>
-      <p:grpSpPr>
-        <a:xfrm>
-          <a:off x="0" y="0"/>
-          <a:ext cx="0" cy="0"/>
-          <a:chOff x="0" y="0"/>
-          <a:chExt cx="0" cy="0"/>
-        </a:xfrm>
-      </p:grpSpPr>
-      <p:sp>
-        <p:nvSpPr>
-          <p:cNvPr id="2" name="Title 1"/>
-          <p:cNvSpPr>
-            <a:spLocks noGrp="1"/>
-          </p:cNvSpPr>
-          <p:nvPr>
-            <p:ph type="title"/>
-          </p:nvPr>
-        </p:nvSpPr>
-        <p:spPr/>
-        <p:txBody>
-          <a:bodyPr/>
-          <a:lstStyle/>
-          <a:p>
-            <a:r>
-              <a:rPr lang="en-US" dirty="0" smtClean="0"/>
-              <a:t>This course</a:t>
-            </a:r>
-            <a:endParaRPr lang="en-US" dirty="0"/>
-          </a:p>
-        </p:txBody>
-      </p:sp>
-      <p:sp>
-        <p:nvSpPr>
-          <p:cNvPr id="3" name="Content Placeholder 2"/>
-          <p:cNvSpPr>
-            <a:spLocks noGrp="1"/>
-          </p:cNvSpPr>
-          <p:nvPr>
-            <p:ph idx="1"/>
-          </p:nvPr>
-        </p:nvSpPr>
-        <p:spPr/>
-        <p:txBody>
-          <a:bodyPr>
-            <a:normAutofit fontScale="92500" lnSpcReduction="20000"/>
-          </a:bodyPr>
-          <a:lstStyle/>
-          <a:p>
-            <a:pPr>
-              <a:spcAft>
-                <a:spcPts val="1200"/>
-              </a:spcAft>
-            </a:pPr>
-            <a:r>
-              <a:rPr lang="en-US" dirty="0" smtClean="0"/>
-              <a:t>Split into 4 sections introducing programming with the Python language and going into some biological examples</a:t>
-            </a:r>
-          </a:p>
-          <a:p>
-            <a:pPr>
-              <a:spcAft>
-                <a:spcPts val="1200"/>
-              </a:spcAft>
-            </a:pPr>
-            <a:r>
-              <a:rPr lang="en-US" dirty="0" smtClean="0"/>
-              <a:t>We’d like you to follow along with the example code as we go through the material, and attempt the exercises to practice what you’ve learned</a:t>
-            </a:r>
-          </a:p>
-          <a:p>
-            <a:pPr>
-              <a:spcAft>
-                <a:spcPts val="1200"/>
-              </a:spcAft>
-            </a:pPr>
-            <a:r>
-              <a:rPr lang="en-US" dirty="0" smtClean="0"/>
-              <a:t>Questions are welcome at any point!</a:t>
-            </a:r>
-          </a:p>
-          <a:p>
-            <a:pPr>
-              <a:spcAft>
-                <a:spcPts val="1200"/>
-              </a:spcAft>
-            </a:pPr>
-            <a:r>
-              <a:rPr lang="en-US" dirty="0" smtClean="0"/>
-              <a:t>If you have specific projects/problems you like to use Python for we are happy to (try to) help during the exercises</a:t>
-            </a:r>
-            <a:endParaRPr lang="en-US" dirty="0"/>
-          </a:p>
-        </p:txBody>
-      </p:sp>
-    </p:spTree>
-    <p:extLst>
-      <p:ext uri="{BB962C8B-B14F-4D97-AF65-F5344CB8AC3E}">
-        <p14:creationId xmlns:p14="http://schemas.microsoft.com/office/powerpoint/2010/main" val="1586397150"/>
-      </p:ext>
-    </p:extLst>
-  </p:cSld>
-  <p:clrMapOvr>
-    <a:masterClrMapping/>
-  </p:clrMapOvr>
-  <p:timing>
-    <p:tnLst>
-      <p:par>
-        <p:cTn xmlns:p14="http://schemas.microsoft.com/office/powerpoint/2010/main" id="1" dur="indefinite" restart="never" nodeType="tmRoot"/>
-      </p:par>
-    </p:tnLst>
-  </p:timing>
-</p:sld>
-</file>
-
-<file path=ppt/slides/slide3.xml><?xml version="1.0" encoding="utf-8"?>
-<p:sld xmlns:a="http://schemas.openxmlformats.org/drawingml/2006/main" xmlns:r="http://schemas.openxmlformats.org/officeDocument/2006/relationships" xmlns:p="http://schemas.openxmlformats.org/presentationml/2006/main">
-  <p:cSld>
-    <p:spTree>
-      <p:nvGrpSpPr>
-        <p:cNvPr id="1" name=""/>
-        <p:cNvGrpSpPr/>
-        <p:nvPr/>
-      </p:nvGrpSpPr>
-      <p:grpSpPr>
-        <a:xfrm>
-          <a:off x="0" y="0"/>
-          <a:ext cx="0" cy="0"/>
-          <a:chOff x="0" y="0"/>
-          <a:chExt cx="0" cy="0"/>
-        </a:xfrm>
-      </p:grpSpPr>
-      <p:sp>
-        <p:nvSpPr>
-          <p:cNvPr id="2" name="Title 1"/>
-          <p:cNvSpPr>
-            <a:spLocks noGrp="1"/>
-          </p:cNvSpPr>
-          <p:nvPr>
-            <p:ph type="title"/>
-          </p:nvPr>
-        </p:nvSpPr>
-        <p:spPr/>
-        <p:txBody>
-          <a:bodyPr/>
-          <a:lstStyle/>
-          <a:p>
-            <a:r>
-              <a:rPr lang="en-US" dirty="0" smtClean="0"/>
-              <a:t>Course structure</a:t>
-            </a:r>
-            <a:endParaRPr lang="en-US" dirty="0"/>
-          </a:p>
-        </p:txBody>
-      </p:sp>
-      <p:sp>
-        <p:nvSpPr>
-          <p:cNvPr id="3" name="Content Placeholder 2"/>
-          <p:cNvSpPr>
-            <a:spLocks noGrp="1"/>
-          </p:cNvSpPr>
-          <p:nvPr>
-            <p:ph idx="1"/>
-          </p:nvPr>
-        </p:nvSpPr>
-        <p:spPr/>
-        <p:txBody>
-          <a:bodyPr>
-            <a:normAutofit fontScale="92500" lnSpcReduction="20000"/>
-          </a:bodyPr>
-          <a:lstStyle/>
-          <a:p>
-            <a:pPr>
-              <a:spcAft>
-                <a:spcPts val="600"/>
-              </a:spcAft>
-            </a:pPr>
-            <a:r>
-              <a:rPr lang="en-US" dirty="0" smtClean="0"/>
-              <a:t>Day 1:</a:t>
-            </a:r>
-          </a:p>
-          <a:p>
-            <a:pPr lvl="1">
-              <a:spcAft>
-                <a:spcPts val="600"/>
-              </a:spcAft>
-            </a:pPr>
-            <a:r>
-              <a:rPr lang="en-US" dirty="0" smtClean="0"/>
-              <a:t>Morning: running the Python interpreter, variables and types, arithmetic, basic data structures</a:t>
-            </a:r>
-          </a:p>
-          <a:p>
-            <a:pPr lvl="1">
-              <a:spcAft>
-                <a:spcPts val="600"/>
-              </a:spcAft>
-            </a:pPr>
-            <a:r>
-              <a:rPr lang="en-US" dirty="0" smtClean="0"/>
-              <a:t>Afternoon: logic &amp; flow control, loops, exceptions, importing libraries</a:t>
-            </a:r>
-          </a:p>
-          <a:p>
-            <a:pPr>
-              <a:spcAft>
-                <a:spcPts val="600"/>
-              </a:spcAft>
-            </a:pPr>
-            <a:r>
-              <a:rPr lang="en-US" dirty="0" smtClean="0"/>
-              <a:t>Day 2:</a:t>
-            </a:r>
-          </a:p>
-          <a:p>
-            <a:pPr lvl="1">
-              <a:spcAft>
-                <a:spcPts val="600"/>
-              </a:spcAft>
-            </a:pPr>
-            <a:r>
-              <a:rPr lang="en-US" dirty="0" smtClean="0"/>
-              <a:t>Morning: custom functions, variable scope, some biological examples</a:t>
-            </a:r>
-          </a:p>
-          <a:p>
-            <a:pPr lvl="1">
-              <a:spcAft>
-                <a:spcPts val="600"/>
-              </a:spcAft>
-            </a:pPr>
-            <a:r>
-              <a:rPr lang="en-US" dirty="0" smtClean="0"/>
-              <a:t>Afternoon: dealing with files, parsing file formats, introduction to </a:t>
-            </a:r>
-            <a:r>
-              <a:rPr lang="en-US" dirty="0" err="1" smtClean="0"/>
-              <a:t>BioPython</a:t>
-            </a:r>
-            <a:endParaRPr lang="en-US" dirty="0" smtClean="0"/>
-          </a:p>
-          <a:p>
-            <a:pPr lvl="1"/>
-            <a:endParaRPr lang="en-US" dirty="0" smtClean="0"/>
-          </a:p>
-        </p:txBody>
-      </p:sp>
-    </p:spTree>
-    <p:extLst>
-      <p:ext uri="{BB962C8B-B14F-4D97-AF65-F5344CB8AC3E}">
-        <p14:creationId xmlns:p14="http://schemas.microsoft.com/office/powerpoint/2010/main" val="1462945205"/>
-      </p:ext>
-    </p:extLst>
-  </p:cSld>
-  <p:clrMapOvr>
-    <a:masterClrMapping/>
-  </p:clrMapOvr>
-  <p:timing>
-    <p:tnLst>
-      <p:par>
-        <p:cTn xmlns:p14="http://schemas.microsoft.com/office/powerpoint/2010/main" id="1" dur="indefinite" restart="never" nodeType="tmRoot"/>
-      </p:par>
-    </p:tnLst>
-  </p:timing>
-</p:sld>
-</file>
-
-<file path=ppt/slides/slide4.xml><?xml version="1.0" encoding="utf-8"?>
-<p:sld xmlns:a="http://schemas.openxmlformats.org/drawingml/2006/main" xmlns:r="http://schemas.openxmlformats.org/officeDocument/2006/relationships" xmlns:p="http://schemas.openxmlformats.org/presentationml/2006/main">
-  <p:cSld>
-    <p:spTree>
-      <p:nvGrpSpPr>
-        <p:cNvPr id="1" name=""/>
-        <p:cNvGrpSpPr/>
-        <p:nvPr/>
-      </p:nvGrpSpPr>
-      <p:grpSpPr>
-        <a:xfrm>
-          <a:off x="0" y="0"/>
-          <a:ext cx="0" cy="0"/>
-          <a:chOff x="0" y="0"/>
-          <a:chExt cx="0" cy="0"/>
-        </a:xfrm>
-      </p:grpSpPr>
-      <p:sp>
-        <p:nvSpPr>
-          <p:cNvPr id="2" name="Title 1"/>
-          <p:cNvSpPr>
-            <a:spLocks noGrp="1"/>
-          </p:cNvSpPr>
-          <p:nvPr>
-            <p:ph type="title"/>
-          </p:nvPr>
-        </p:nvSpPr>
-        <p:spPr/>
-        <p:txBody>
-          <a:bodyPr/>
-          <a:lstStyle/>
-          <a:p>
-            <a:r>
-              <a:rPr lang="en-US" dirty="0" smtClean="0"/>
-              <a:t>Materials</a:t>
-            </a:r>
-            <a:endParaRPr lang="en-US" dirty="0"/>
-          </a:p>
-        </p:txBody>
-      </p:sp>
-      <p:sp>
-        <p:nvSpPr>
-          <p:cNvPr id="3" name="Content Placeholder 2"/>
-          <p:cNvSpPr>
-            <a:spLocks noGrp="1"/>
-          </p:cNvSpPr>
-          <p:nvPr>
-            <p:ph idx="1"/>
-          </p:nvPr>
-        </p:nvSpPr>
-        <p:spPr/>
-        <p:txBody>
-          <a:bodyPr>
-            <a:normAutofit/>
-          </a:bodyPr>
-          <a:lstStyle/>
-          <a:p>
-            <a:pPr>
-              <a:spcAft>
-                <a:spcPts val="600"/>
-              </a:spcAft>
-            </a:pPr>
-            <a:r>
-              <a:rPr lang="en-US" dirty="0" smtClean="0"/>
-              <a:t>There is a course webpage with links to the materials, example solutions to the exercises etc.:</a:t>
-            </a:r>
-          </a:p>
-          <a:p>
-            <a:pPr lvl="1">
-              <a:spcAft>
-                <a:spcPts val="600"/>
-              </a:spcAft>
-            </a:pPr>
-            <a:r>
-              <a:rPr lang="en-US" sz="3200" dirty="0" smtClean="0">
-                <a:hlinkClick r:id="rId3"/>
-              </a:rPr>
-              <a:t>http://pycam.github.io</a:t>
-            </a:r>
-            <a:endParaRPr lang="en-US" sz="3200" dirty="0" smtClean="0"/>
-          </a:p>
-          <a:p>
-            <a:pPr>
-              <a:spcAft>
-                <a:spcPts val="600"/>
-              </a:spcAft>
-            </a:pPr>
-            <a:r>
-              <a:rPr lang="en-US" dirty="0" smtClean="0"/>
-              <a:t>You are encouraged to follow along with the materials</a:t>
-            </a:r>
-          </a:p>
-          <a:p>
-            <a:pPr>
-              <a:spcAft>
-                <a:spcPts val="600"/>
-              </a:spcAft>
-            </a:pPr>
-            <a:r>
-              <a:rPr lang="en-US" dirty="0" smtClean="0"/>
-              <a:t>NB: this material is still in development, feedback is welcome!</a:t>
-            </a:r>
-          </a:p>
-        </p:txBody>
-      </p:sp>
-    </p:spTree>
-    <p:extLst>
-      <p:ext uri="{BB962C8B-B14F-4D97-AF65-F5344CB8AC3E}">
-        <p14:creationId xmlns:p14="http://schemas.microsoft.com/office/powerpoint/2010/main" val="2325491196"/>
-      </p:ext>
-    </p:extLst>
-  </p:cSld>
-  <p:clrMapOvr>
-    <a:masterClrMapping/>
-  </p:clrMapOvr>
-  <p:timing>
-    <p:tnLst>
-      <p:par>
-        <p:cTn xmlns:p14="http://schemas.microsoft.com/office/powerpoint/2010/main" id="1" dur="indefinite" restart="never" nodeType="tmRoot"/>
-      </p:par>
-    </p:tnLst>
-  </p:timing>
-</p:sld>
-</file>
-
-<file path=ppt/slides/slide5.xml><?xml version="1.0" encoding="utf-8"?>
+<file path=ppt/slides/slide10.xml><?xml version="1.0" encoding="utf-8"?>
 <p:sld xmlns:a="http://schemas.openxmlformats.org/drawingml/2006/main" xmlns:r="http://schemas.openxmlformats.org/officeDocument/2006/relationships" xmlns:p="http://schemas.openxmlformats.org/presentationml/2006/main">
   <p:cSld>
     <p:spTree>
@@ -5798,7 +5420,7 @@
 </p:sld>
 </file>
 
-<file path=ppt/slides/slide6.xml><?xml version="1.0" encoding="utf-8"?>
+<file path=ppt/slides/slide11.xml><?xml version="1.0" encoding="utf-8"?>
 <p:sld xmlns:a="http://schemas.openxmlformats.org/drawingml/2006/main" xmlns:r="http://schemas.openxmlformats.org/officeDocument/2006/relationships" xmlns:p="http://schemas.openxmlformats.org/presentationml/2006/main">
   <p:cSld>
     <p:spTree>
@@ -7392,7 +7014,7 @@
 </p:sld>
 </file>
 
-<file path=ppt/slides/slide7.xml><?xml version="1.0" encoding="utf-8"?>
+<file path=ppt/slides/slide12.xml><?xml version="1.0" encoding="utf-8"?>
 <p:sld xmlns:a="http://schemas.openxmlformats.org/drawingml/2006/main" xmlns:r="http://schemas.openxmlformats.org/officeDocument/2006/relationships" xmlns:p="http://schemas.openxmlformats.org/presentationml/2006/main">
   <p:cSld>
     <p:spTree>
@@ -8330,7 +7952,7 @@
 </p:sld>
 </file>
 
-<file path=ppt/slides/slide8.xml><?xml version="1.0" encoding="utf-8"?>
+<file path=ppt/slides/slide13.xml><?xml version="1.0" encoding="utf-8"?>
 <p:sld xmlns:a="http://schemas.openxmlformats.org/drawingml/2006/main" xmlns:r="http://schemas.openxmlformats.org/officeDocument/2006/relationships" xmlns:p="http://schemas.openxmlformats.org/presentationml/2006/main">
   <p:cSld>
     <p:spTree>
@@ -9253,6 +8875,1127 @@
 </p:sld>
 </file>
 
+<file path=ppt/slides/slide2.xml><?xml version="1.0" encoding="utf-8"?>
+<p:sld xmlns:a="http://schemas.openxmlformats.org/drawingml/2006/main" xmlns:r="http://schemas.openxmlformats.org/officeDocument/2006/relationships" xmlns:p="http://schemas.openxmlformats.org/presentationml/2006/main">
+  <p:cSld>
+    <p:spTree>
+      <p:nvGrpSpPr>
+        <p:cNvPr id="1" name=""/>
+        <p:cNvGrpSpPr/>
+        <p:nvPr/>
+      </p:nvGrpSpPr>
+      <p:grpSpPr>
+        <a:xfrm>
+          <a:off x="0" y="0"/>
+          <a:ext cx="0" cy="0"/>
+          <a:chOff x="0" y="0"/>
+          <a:chExt cx="0" cy="0"/>
+        </a:xfrm>
+      </p:grpSpPr>
+      <p:sp>
+        <p:nvSpPr>
+          <p:cNvPr id="2" name="Title 1"/>
+          <p:cNvSpPr>
+            <a:spLocks noGrp="1"/>
+          </p:cNvSpPr>
+          <p:nvPr>
+            <p:ph type="title"/>
+          </p:nvPr>
+        </p:nvSpPr>
+        <p:spPr/>
+        <p:txBody>
+          <a:bodyPr/>
+          <a:lstStyle/>
+          <a:p>
+            <a:r>
+              <a:rPr lang="en-US" dirty="0" smtClean="0"/>
+              <a:t>This course</a:t>
+            </a:r>
+            <a:endParaRPr lang="en-US" dirty="0"/>
+          </a:p>
+        </p:txBody>
+      </p:sp>
+      <p:sp>
+        <p:nvSpPr>
+          <p:cNvPr id="3" name="Content Placeholder 2"/>
+          <p:cNvSpPr>
+            <a:spLocks noGrp="1"/>
+          </p:cNvSpPr>
+          <p:nvPr>
+            <p:ph idx="1"/>
+          </p:nvPr>
+        </p:nvSpPr>
+        <p:spPr/>
+        <p:txBody>
+          <a:bodyPr>
+            <a:normAutofit fontScale="92500" lnSpcReduction="20000"/>
+          </a:bodyPr>
+          <a:lstStyle/>
+          <a:p>
+            <a:pPr>
+              <a:spcAft>
+                <a:spcPts val="1200"/>
+              </a:spcAft>
+            </a:pPr>
+            <a:r>
+              <a:rPr lang="en-US" dirty="0" smtClean="0"/>
+              <a:t>Split into 4 sections introducing programming with the Python language and going into some biological examples</a:t>
+            </a:r>
+          </a:p>
+          <a:p>
+            <a:pPr>
+              <a:spcAft>
+                <a:spcPts val="1200"/>
+              </a:spcAft>
+            </a:pPr>
+            <a:r>
+              <a:rPr lang="en-US" dirty="0" smtClean="0"/>
+              <a:t>We’d like you to follow along with the example code as we go through the material, and attempt the exercises to practice what you’ve learned</a:t>
+            </a:r>
+          </a:p>
+          <a:p>
+            <a:pPr>
+              <a:spcAft>
+                <a:spcPts val="1200"/>
+              </a:spcAft>
+            </a:pPr>
+            <a:r>
+              <a:rPr lang="en-US" dirty="0" smtClean="0"/>
+              <a:t>Questions are welcome at any point!</a:t>
+            </a:r>
+          </a:p>
+          <a:p>
+            <a:pPr>
+              <a:spcAft>
+                <a:spcPts val="1200"/>
+              </a:spcAft>
+            </a:pPr>
+            <a:r>
+              <a:rPr lang="en-US" dirty="0" smtClean="0"/>
+              <a:t>If you have specific projects/problems you like to use Python for we are happy to (try to) help during the exercises</a:t>
+            </a:r>
+            <a:endParaRPr lang="en-US" dirty="0"/>
+          </a:p>
+        </p:txBody>
+      </p:sp>
+    </p:spTree>
+    <p:extLst>
+      <p:ext uri="{BB962C8B-B14F-4D97-AF65-F5344CB8AC3E}">
+        <p14:creationId xmlns:p14="http://schemas.microsoft.com/office/powerpoint/2010/main" val="1586397150"/>
+      </p:ext>
+    </p:extLst>
+  </p:cSld>
+  <p:clrMapOvr>
+    <a:masterClrMapping/>
+  </p:clrMapOvr>
+  <p:timing>
+    <p:tnLst>
+      <p:par>
+        <p:cTn xmlns:p14="http://schemas.microsoft.com/office/powerpoint/2010/main" id="1" dur="indefinite" restart="never" nodeType="tmRoot"/>
+      </p:par>
+    </p:tnLst>
+  </p:timing>
+</p:sld>
+</file>
+
+<file path=ppt/slides/slide3.xml><?xml version="1.0" encoding="utf-8"?>
+<p:sld xmlns:a="http://schemas.openxmlformats.org/drawingml/2006/main" xmlns:r="http://schemas.openxmlformats.org/officeDocument/2006/relationships" xmlns:p="http://schemas.openxmlformats.org/presentationml/2006/main">
+  <p:cSld>
+    <p:spTree>
+      <p:nvGrpSpPr>
+        <p:cNvPr id="1" name=""/>
+        <p:cNvGrpSpPr/>
+        <p:nvPr/>
+      </p:nvGrpSpPr>
+      <p:grpSpPr>
+        <a:xfrm>
+          <a:off x="0" y="0"/>
+          <a:ext cx="0" cy="0"/>
+          <a:chOff x="0" y="0"/>
+          <a:chExt cx="0" cy="0"/>
+        </a:xfrm>
+      </p:grpSpPr>
+      <p:sp>
+        <p:nvSpPr>
+          <p:cNvPr id="2" name="Title 1"/>
+          <p:cNvSpPr>
+            <a:spLocks noGrp="1"/>
+          </p:cNvSpPr>
+          <p:nvPr>
+            <p:ph type="title"/>
+          </p:nvPr>
+        </p:nvSpPr>
+        <p:spPr/>
+        <p:txBody>
+          <a:bodyPr/>
+          <a:lstStyle/>
+          <a:p>
+            <a:r>
+              <a:rPr lang="en-US" dirty="0" smtClean="0"/>
+              <a:t>Course structure</a:t>
+            </a:r>
+            <a:endParaRPr lang="en-US" dirty="0"/>
+          </a:p>
+        </p:txBody>
+      </p:sp>
+      <p:sp>
+        <p:nvSpPr>
+          <p:cNvPr id="3" name="Content Placeholder 2"/>
+          <p:cNvSpPr>
+            <a:spLocks noGrp="1"/>
+          </p:cNvSpPr>
+          <p:nvPr>
+            <p:ph idx="1"/>
+          </p:nvPr>
+        </p:nvSpPr>
+        <p:spPr/>
+        <p:txBody>
+          <a:bodyPr>
+            <a:normAutofit fontScale="92500" lnSpcReduction="20000"/>
+          </a:bodyPr>
+          <a:lstStyle/>
+          <a:p>
+            <a:pPr>
+              <a:spcAft>
+                <a:spcPts val="600"/>
+              </a:spcAft>
+            </a:pPr>
+            <a:r>
+              <a:rPr lang="en-US" dirty="0" smtClean="0"/>
+              <a:t>Day 1:</a:t>
+            </a:r>
+          </a:p>
+          <a:p>
+            <a:pPr lvl="1">
+              <a:spcAft>
+                <a:spcPts val="600"/>
+              </a:spcAft>
+            </a:pPr>
+            <a:r>
+              <a:rPr lang="en-US" dirty="0" smtClean="0"/>
+              <a:t>Morning: running the Python interpreter, variables and types, arithmetic, basic data structures</a:t>
+            </a:r>
+          </a:p>
+          <a:p>
+            <a:pPr lvl="1">
+              <a:spcAft>
+                <a:spcPts val="600"/>
+              </a:spcAft>
+            </a:pPr>
+            <a:r>
+              <a:rPr lang="en-US" dirty="0" smtClean="0"/>
+              <a:t>Afternoon: logic &amp; flow control, loops, exceptions, importing libraries</a:t>
+            </a:r>
+          </a:p>
+          <a:p>
+            <a:pPr>
+              <a:spcAft>
+                <a:spcPts val="600"/>
+              </a:spcAft>
+            </a:pPr>
+            <a:r>
+              <a:rPr lang="en-US" dirty="0" smtClean="0"/>
+              <a:t>Day 2:</a:t>
+            </a:r>
+          </a:p>
+          <a:p>
+            <a:pPr lvl="1">
+              <a:spcAft>
+                <a:spcPts val="600"/>
+              </a:spcAft>
+            </a:pPr>
+            <a:r>
+              <a:rPr lang="en-US" dirty="0" smtClean="0"/>
+              <a:t>Morning: custom functions, variable scope, some biological examples</a:t>
+            </a:r>
+          </a:p>
+          <a:p>
+            <a:pPr lvl="1">
+              <a:spcAft>
+                <a:spcPts val="600"/>
+              </a:spcAft>
+            </a:pPr>
+            <a:r>
+              <a:rPr lang="en-US" dirty="0" smtClean="0"/>
+              <a:t>Afternoon: dealing with files, parsing file formats, introduction to </a:t>
+            </a:r>
+            <a:r>
+              <a:rPr lang="en-US" dirty="0" err="1" smtClean="0"/>
+              <a:t>BioPython</a:t>
+            </a:r>
+            <a:endParaRPr lang="en-US" dirty="0" smtClean="0"/>
+          </a:p>
+          <a:p>
+            <a:pPr lvl="1"/>
+            <a:endParaRPr lang="en-US" dirty="0" smtClean="0"/>
+          </a:p>
+        </p:txBody>
+      </p:sp>
+    </p:spTree>
+    <p:extLst>
+      <p:ext uri="{BB962C8B-B14F-4D97-AF65-F5344CB8AC3E}">
+        <p14:creationId xmlns:p14="http://schemas.microsoft.com/office/powerpoint/2010/main" val="1462945205"/>
+      </p:ext>
+    </p:extLst>
+  </p:cSld>
+  <p:clrMapOvr>
+    <a:masterClrMapping/>
+  </p:clrMapOvr>
+  <p:timing>
+    <p:tnLst>
+      <p:par>
+        <p:cTn xmlns:p14="http://schemas.microsoft.com/office/powerpoint/2010/main" id="1" dur="indefinite" restart="never" nodeType="tmRoot"/>
+      </p:par>
+    </p:tnLst>
+  </p:timing>
+</p:sld>
+</file>
+
+<file path=ppt/slides/slide4.xml><?xml version="1.0" encoding="utf-8"?>
+<p:sld xmlns:a="http://schemas.openxmlformats.org/drawingml/2006/main" xmlns:r="http://schemas.openxmlformats.org/officeDocument/2006/relationships" xmlns:p="http://schemas.openxmlformats.org/presentationml/2006/main">
+  <p:cSld>
+    <p:spTree>
+      <p:nvGrpSpPr>
+        <p:cNvPr id="1" name=""/>
+        <p:cNvGrpSpPr/>
+        <p:nvPr/>
+      </p:nvGrpSpPr>
+      <p:grpSpPr>
+        <a:xfrm>
+          <a:off x="0" y="0"/>
+          <a:ext cx="0" cy="0"/>
+          <a:chOff x="0" y="0"/>
+          <a:chExt cx="0" cy="0"/>
+        </a:xfrm>
+      </p:grpSpPr>
+      <p:sp>
+        <p:nvSpPr>
+          <p:cNvPr id="2" name="Title 1"/>
+          <p:cNvSpPr>
+            <a:spLocks noGrp="1"/>
+          </p:cNvSpPr>
+          <p:nvPr>
+            <p:ph type="title"/>
+          </p:nvPr>
+        </p:nvSpPr>
+        <p:spPr/>
+        <p:txBody>
+          <a:bodyPr/>
+          <a:lstStyle/>
+          <a:p>
+            <a:r>
+              <a:rPr lang="en-US" dirty="0" smtClean="0"/>
+              <a:t>Materials</a:t>
+            </a:r>
+            <a:endParaRPr lang="en-US" dirty="0"/>
+          </a:p>
+        </p:txBody>
+      </p:sp>
+      <p:sp>
+        <p:nvSpPr>
+          <p:cNvPr id="3" name="Content Placeholder 2"/>
+          <p:cNvSpPr>
+            <a:spLocks noGrp="1"/>
+          </p:cNvSpPr>
+          <p:nvPr>
+            <p:ph idx="1"/>
+          </p:nvPr>
+        </p:nvSpPr>
+        <p:spPr/>
+        <p:txBody>
+          <a:bodyPr>
+            <a:normAutofit/>
+          </a:bodyPr>
+          <a:lstStyle/>
+          <a:p>
+            <a:pPr>
+              <a:spcAft>
+                <a:spcPts val="600"/>
+              </a:spcAft>
+            </a:pPr>
+            <a:r>
+              <a:rPr lang="en-US" dirty="0" smtClean="0"/>
+              <a:t>There is a course webpage with links to the materials, example solutions to the exercises etc.:</a:t>
+            </a:r>
+          </a:p>
+          <a:p>
+            <a:pPr lvl="1">
+              <a:spcAft>
+                <a:spcPts val="600"/>
+              </a:spcAft>
+            </a:pPr>
+            <a:r>
+              <a:rPr lang="en-US" sz="3200" dirty="0" smtClean="0">
+                <a:hlinkClick r:id="rId3"/>
+              </a:rPr>
+              <a:t>http://pycam.github.io</a:t>
+            </a:r>
+            <a:endParaRPr lang="en-US" sz="3200" dirty="0" smtClean="0"/>
+          </a:p>
+          <a:p>
+            <a:pPr>
+              <a:spcAft>
+                <a:spcPts val="600"/>
+              </a:spcAft>
+            </a:pPr>
+            <a:r>
+              <a:rPr lang="en-US" dirty="0" smtClean="0"/>
+              <a:t>You are encouraged to follow along with the materials</a:t>
+            </a:r>
+          </a:p>
+        </p:txBody>
+      </p:sp>
+    </p:spTree>
+    <p:extLst>
+      <p:ext uri="{BB962C8B-B14F-4D97-AF65-F5344CB8AC3E}">
+        <p14:creationId xmlns:p14="http://schemas.microsoft.com/office/powerpoint/2010/main" val="2325491196"/>
+      </p:ext>
+    </p:extLst>
+  </p:cSld>
+  <p:clrMapOvr>
+    <a:masterClrMapping/>
+  </p:clrMapOvr>
+  <p:timing>
+    <p:tnLst>
+      <p:par>
+        <p:cTn xmlns:p14="http://schemas.microsoft.com/office/powerpoint/2010/main" id="1" dur="indefinite" restart="never" nodeType="tmRoot"/>
+      </p:par>
+    </p:tnLst>
+  </p:timing>
+</p:sld>
+</file>
+
+<file path=ppt/slides/slide5.xml><?xml version="1.0" encoding="utf-8"?>
+<p:sld xmlns:a="http://schemas.openxmlformats.org/drawingml/2006/main" xmlns:r="http://schemas.openxmlformats.org/officeDocument/2006/relationships" xmlns:p="http://schemas.openxmlformats.org/presentationml/2006/main">
+  <p:cSld>
+    <p:spTree>
+      <p:nvGrpSpPr>
+        <p:cNvPr id="1" name=""/>
+        <p:cNvGrpSpPr/>
+        <p:nvPr/>
+      </p:nvGrpSpPr>
+      <p:grpSpPr>
+        <a:xfrm>
+          <a:off x="0" y="0"/>
+          <a:ext cx="0" cy="0"/>
+          <a:chOff x="0" y="0"/>
+          <a:chExt cx="0" cy="0"/>
+        </a:xfrm>
+      </p:grpSpPr>
+      <p:sp>
+        <p:nvSpPr>
+          <p:cNvPr id="4" name="Title 3"/>
+          <p:cNvSpPr>
+            <a:spLocks noGrp="1"/>
+          </p:cNvSpPr>
+          <p:nvPr>
+            <p:ph type="title"/>
+          </p:nvPr>
+        </p:nvSpPr>
+        <p:spPr/>
+        <p:txBody>
+          <a:bodyPr/>
+          <a:lstStyle/>
+          <a:p>
+            <a:r>
+              <a:rPr lang="en-US" dirty="0" smtClean="0"/>
+              <a:t>Getting started</a:t>
+            </a:r>
+            <a:endParaRPr lang="en-US" dirty="0"/>
+          </a:p>
+        </p:txBody>
+      </p:sp>
+      <p:sp>
+        <p:nvSpPr>
+          <p:cNvPr id="5" name="Content Placeholder 4"/>
+          <p:cNvSpPr>
+            <a:spLocks noGrp="1"/>
+          </p:cNvSpPr>
+          <p:nvPr>
+            <p:ph idx="1"/>
+          </p:nvPr>
+        </p:nvSpPr>
+        <p:spPr/>
+        <p:txBody>
+          <a:bodyPr/>
+          <a:lstStyle/>
+          <a:p>
+            <a:r>
+              <a:rPr lang="en-US" dirty="0" smtClean="0"/>
+              <a:t>Python is an interpreted language, this means that your computer does not run Python code natively, but instead we run our code using the Python interpreter</a:t>
+            </a:r>
+          </a:p>
+          <a:p>
+            <a:r>
+              <a:rPr lang="en-US" dirty="0" smtClean="0"/>
+              <a:t>2 ways to run Python code</a:t>
+            </a:r>
+          </a:p>
+          <a:p>
+            <a:pPr lvl="1"/>
+            <a:r>
+              <a:rPr lang="en-US" dirty="0" smtClean="0"/>
+              <a:t>Directly typing commands into the interpreter</a:t>
+            </a:r>
+          </a:p>
+          <a:p>
+            <a:pPr lvl="1"/>
+            <a:r>
+              <a:rPr lang="en-US" dirty="0" smtClean="0"/>
+              <a:t>Typing code into a file and telling the interpreter to run the code from this file</a:t>
+            </a:r>
+            <a:endParaRPr lang="en-US" dirty="0"/>
+          </a:p>
+        </p:txBody>
+      </p:sp>
+    </p:spTree>
+    <p:extLst>
+      <p:ext uri="{BB962C8B-B14F-4D97-AF65-F5344CB8AC3E}">
+        <p14:creationId xmlns:p14="http://schemas.microsoft.com/office/powerpoint/2010/main" val="1758431957"/>
+      </p:ext>
+    </p:extLst>
+  </p:cSld>
+  <p:clrMapOvr>
+    <a:masterClrMapping/>
+  </p:clrMapOvr>
+</p:sld>
+</file>
+
+<file path=ppt/slides/slide6.xml><?xml version="1.0" encoding="utf-8"?>
+<p:sld xmlns:a="http://schemas.openxmlformats.org/drawingml/2006/main" xmlns:r="http://schemas.openxmlformats.org/officeDocument/2006/relationships" xmlns:p="http://schemas.openxmlformats.org/presentationml/2006/main">
+  <p:cSld>
+    <p:spTree>
+      <p:nvGrpSpPr>
+        <p:cNvPr id="1" name=""/>
+        <p:cNvGrpSpPr/>
+        <p:nvPr/>
+      </p:nvGrpSpPr>
+      <p:grpSpPr>
+        <a:xfrm>
+          <a:off x="0" y="0"/>
+          <a:ext cx="0" cy="0"/>
+          <a:chOff x="0" y="0"/>
+          <a:chExt cx="0" cy="0"/>
+        </a:xfrm>
+      </p:grpSpPr>
+      <p:sp>
+        <p:nvSpPr>
+          <p:cNvPr id="2" name="Title 1"/>
+          <p:cNvSpPr>
+            <a:spLocks noGrp="1"/>
+          </p:cNvSpPr>
+          <p:nvPr>
+            <p:ph type="title"/>
+          </p:nvPr>
+        </p:nvSpPr>
+        <p:spPr/>
+        <p:txBody>
+          <a:bodyPr>
+            <a:normAutofit fontScale="90000"/>
+          </a:bodyPr>
+          <a:lstStyle/>
+          <a:p>
+            <a:r>
+              <a:rPr lang="en-US" dirty="0" smtClean="0"/>
+              <a:t>How to start the Python interpreter?</a:t>
+            </a:r>
+            <a:endParaRPr lang="en-US" dirty="0"/>
+          </a:p>
+        </p:txBody>
+      </p:sp>
+      <p:sp>
+        <p:nvSpPr>
+          <p:cNvPr id="3" name="Content Placeholder 2"/>
+          <p:cNvSpPr>
+            <a:spLocks noGrp="1"/>
+          </p:cNvSpPr>
+          <p:nvPr>
+            <p:ph idx="1"/>
+          </p:nvPr>
+        </p:nvSpPr>
+        <p:spPr/>
+        <p:txBody>
+          <a:bodyPr/>
+          <a:lstStyle/>
+          <a:p>
+            <a:r>
+              <a:rPr lang="en-US" dirty="0" smtClean="0"/>
+              <a:t>Start a terminal and just type the command </a:t>
+            </a:r>
+            <a:r>
+              <a:rPr lang="en-US" dirty="0" smtClean="0">
+                <a:latin typeface="Courier"/>
+                <a:cs typeface="Courier"/>
+              </a:rPr>
+              <a:t>python</a:t>
+            </a:r>
+            <a:r>
+              <a:rPr lang="en-US" dirty="0" smtClean="0"/>
+              <a:t> in it (on a Mac or Linux machine)</a:t>
+            </a:r>
+          </a:p>
+          <a:p>
+            <a:r>
+              <a:rPr lang="en-US" dirty="0" smtClean="0"/>
+              <a:t>This will print out some information about your installation of python and then leave you with a command prompt which looks like &gt;&gt;&gt; </a:t>
+            </a:r>
+          </a:p>
+          <a:p>
+            <a:r>
+              <a:rPr lang="en-US" dirty="0" smtClean="0"/>
+              <a:t>If you want to exit the interactive interpreter you can type the command </a:t>
+            </a:r>
+            <a:r>
+              <a:rPr lang="en-US" dirty="0" smtClean="0">
+                <a:latin typeface="Courier"/>
+                <a:cs typeface="Courier"/>
+              </a:rPr>
+              <a:t>quit()</a:t>
+            </a:r>
+            <a:r>
+              <a:rPr lang="en-US" dirty="0" smtClean="0"/>
+              <a:t> or type Ctrl-D</a:t>
+            </a:r>
+            <a:endParaRPr lang="en-US" dirty="0"/>
+          </a:p>
+        </p:txBody>
+      </p:sp>
+    </p:spTree>
+    <p:extLst>
+      <p:ext uri="{BB962C8B-B14F-4D97-AF65-F5344CB8AC3E}">
+        <p14:creationId xmlns:p14="http://schemas.microsoft.com/office/powerpoint/2010/main" val="2131241861"/>
+      </p:ext>
+    </p:extLst>
+  </p:cSld>
+  <p:clrMapOvr>
+    <a:masterClrMapping/>
+  </p:clrMapOvr>
+</p:sld>
+</file>
+
+<file path=ppt/slides/slide7.xml><?xml version="1.0" encoding="utf-8"?>
+<p:sld xmlns:a="http://schemas.openxmlformats.org/drawingml/2006/main" xmlns:r="http://schemas.openxmlformats.org/officeDocument/2006/relationships" xmlns:p="http://schemas.openxmlformats.org/presentationml/2006/main">
+  <p:cSld>
+    <p:spTree>
+      <p:nvGrpSpPr>
+        <p:cNvPr id="1" name=""/>
+        <p:cNvGrpSpPr/>
+        <p:nvPr/>
+      </p:nvGrpSpPr>
+      <p:grpSpPr>
+        <a:xfrm>
+          <a:off x="0" y="0"/>
+          <a:ext cx="0" cy="0"/>
+          <a:chOff x="0" y="0"/>
+          <a:chExt cx="0" cy="0"/>
+        </a:xfrm>
+      </p:grpSpPr>
+      <p:pic>
+        <p:nvPicPr>
+          <p:cNvPr id="4" name="Picture 3" descr="Screen Shot 2015-04-29 at 17.29.25.png"/>
+          <p:cNvPicPr>
+            <a:picLocks noChangeAspect="1"/>
+          </p:cNvPicPr>
+          <p:nvPr/>
+        </p:nvPicPr>
+        <p:blipFill>
+          <a:blip r:embed="rId2">
+            <a:extLst>
+              <a:ext uri="{28A0092B-C50C-407E-A947-70E740481C1C}">
+                <a14:useLocalDpi xmlns:a14="http://schemas.microsoft.com/office/drawing/2010/main" val="0"/>
+              </a:ext>
+            </a:extLst>
+          </a:blip>
+          <a:stretch>
+            <a:fillRect/>
+          </a:stretch>
+        </p:blipFill>
+        <p:spPr>
+          <a:xfrm>
+            <a:off x="-51378" y="0"/>
+            <a:ext cx="9195378" cy="6819044"/>
+          </a:xfrm>
+          <a:prstGeom prst="rect">
+            <a:avLst/>
+          </a:prstGeom>
+        </p:spPr>
+      </p:pic>
+    </p:spTree>
+    <p:extLst>
+      <p:ext uri="{BB962C8B-B14F-4D97-AF65-F5344CB8AC3E}">
+        <p14:creationId xmlns:p14="http://schemas.microsoft.com/office/powerpoint/2010/main" val="3175204205"/>
+      </p:ext>
+    </p:extLst>
+  </p:cSld>
+  <p:clrMapOvr>
+    <a:masterClrMapping/>
+  </p:clrMapOvr>
+</p:sld>
+</file>
+
+<file path=ppt/slides/slide8.xml><?xml version="1.0" encoding="utf-8"?>
+<p:sld xmlns:a="http://schemas.openxmlformats.org/drawingml/2006/main" xmlns:r="http://schemas.openxmlformats.org/officeDocument/2006/relationships" xmlns:p="http://schemas.openxmlformats.org/presentationml/2006/main">
+  <p:cSld>
+    <p:spTree>
+      <p:nvGrpSpPr>
+        <p:cNvPr id="1" name=""/>
+        <p:cNvGrpSpPr/>
+        <p:nvPr/>
+      </p:nvGrpSpPr>
+      <p:grpSpPr>
+        <a:xfrm>
+          <a:off x="0" y="0"/>
+          <a:ext cx="0" cy="0"/>
+          <a:chOff x="0" y="0"/>
+          <a:chExt cx="0" cy="0"/>
+        </a:xfrm>
+      </p:grpSpPr>
+      <p:pic>
+        <p:nvPicPr>
+          <p:cNvPr id="3" name="Picture 2"/>
+          <p:cNvPicPr>
+            <a:picLocks noChangeAspect="1"/>
+          </p:cNvPicPr>
+          <p:nvPr/>
+        </p:nvPicPr>
+        <p:blipFill>
+          <a:blip r:embed="rId2"/>
+          <a:stretch>
+            <a:fillRect/>
+          </a:stretch>
+        </p:blipFill>
+        <p:spPr>
+          <a:xfrm>
+            <a:off x="182740" y="356784"/>
+            <a:ext cx="6604000" cy="850900"/>
+          </a:xfrm>
+          <a:prstGeom prst="rect">
+            <a:avLst/>
+          </a:prstGeom>
+        </p:spPr>
+      </p:pic>
+      <p:pic>
+        <p:nvPicPr>
+          <p:cNvPr id="4" name="Picture 3" descr="Screen Shot 2015-04-29 at 17.37.33.png"/>
+          <p:cNvPicPr>
+            <a:picLocks noChangeAspect="1"/>
+          </p:cNvPicPr>
+          <p:nvPr/>
+        </p:nvPicPr>
+        <p:blipFill>
+          <a:blip r:embed="rId3">
+            <a:extLst>
+              <a:ext uri="{28A0092B-C50C-407E-A947-70E740481C1C}">
+                <a14:useLocalDpi xmlns:a14="http://schemas.microsoft.com/office/drawing/2010/main" val="0"/>
+              </a:ext>
+            </a:extLst>
+          </a:blip>
+          <a:stretch>
+            <a:fillRect/>
+          </a:stretch>
+        </p:blipFill>
+        <p:spPr>
+          <a:xfrm>
+            <a:off x="7741672" y="164455"/>
+            <a:ext cx="1155625" cy="1225205"/>
+          </a:xfrm>
+          <a:prstGeom prst="rect">
+            <a:avLst/>
+          </a:prstGeom>
+        </p:spPr>
+      </p:pic>
+      <p:sp>
+        <p:nvSpPr>
+          <p:cNvPr id="11" name="Content Placeholder 2"/>
+          <p:cNvSpPr txBox="1">
+            <a:spLocks/>
+          </p:cNvSpPr>
+          <p:nvPr/>
+        </p:nvSpPr>
+        <p:spPr>
+          <a:xfrm>
+            <a:off x="457200" y="1600200"/>
+            <a:ext cx="8229600" cy="4525963"/>
+          </a:xfrm>
+          <a:prstGeom prst="rect">
+            <a:avLst/>
+          </a:prstGeom>
+        </p:spPr>
+        <p:txBody>
+          <a:bodyPr>
+            <a:normAutofit fontScale="85000" lnSpcReduction="20000"/>
+          </a:bodyPr>
+          <a:lstStyle>
+            <a:lvl1pPr marL="342900" indent="-342900" algn="l" defTabSz="457200" rtl="0" eaLnBrk="1" latinLnBrk="0" hangingPunct="1">
+              <a:spcBef>
+                <a:spcPct val="20000"/>
+              </a:spcBef>
+              <a:buFont typeface="Arial"/>
+              <a:buChar char="•"/>
+              <a:defRPr sz="3200" kern="1200">
+                <a:solidFill>
+                  <a:schemeClr val="tx1"/>
+                </a:solidFill>
+                <a:latin typeface="+mn-lt"/>
+                <a:ea typeface="+mn-ea"/>
+                <a:cs typeface="+mn-cs"/>
+              </a:defRPr>
+            </a:lvl1pPr>
+            <a:lvl2pPr marL="742950" indent="-285750" algn="l" defTabSz="457200" rtl="0" eaLnBrk="1" latinLnBrk="0" hangingPunct="1">
+              <a:spcBef>
+                <a:spcPct val="20000"/>
+              </a:spcBef>
+              <a:buFont typeface="Arial"/>
+              <a:buChar char="–"/>
+              <a:defRPr sz="2800" kern="1200">
+                <a:solidFill>
+                  <a:schemeClr val="tx1"/>
+                </a:solidFill>
+                <a:latin typeface="+mn-lt"/>
+                <a:ea typeface="+mn-ea"/>
+                <a:cs typeface="+mn-cs"/>
+              </a:defRPr>
+            </a:lvl2pPr>
+            <a:lvl3pPr marL="1143000" indent="-228600" algn="l" defTabSz="457200" rtl="0" eaLnBrk="1" latinLnBrk="0" hangingPunct="1">
+              <a:spcBef>
+                <a:spcPct val="20000"/>
+              </a:spcBef>
+              <a:buFont typeface="Arial"/>
+              <a:buChar char="•"/>
+              <a:defRPr sz="2400" kern="1200">
+                <a:solidFill>
+                  <a:schemeClr val="tx1"/>
+                </a:solidFill>
+                <a:latin typeface="+mn-lt"/>
+                <a:ea typeface="+mn-ea"/>
+                <a:cs typeface="+mn-cs"/>
+              </a:defRPr>
+            </a:lvl3pPr>
+            <a:lvl4pPr marL="1600200" indent="-228600" algn="l" defTabSz="457200" rtl="0" eaLnBrk="1" latinLnBrk="0" hangingPunct="1">
+              <a:spcBef>
+                <a:spcPct val="20000"/>
+              </a:spcBef>
+              <a:buFont typeface="Arial"/>
+              <a:buChar char="–"/>
+              <a:defRPr sz="2000" kern="1200">
+                <a:solidFill>
+                  <a:schemeClr val="tx1"/>
+                </a:solidFill>
+                <a:latin typeface="+mn-lt"/>
+                <a:ea typeface="+mn-ea"/>
+                <a:cs typeface="+mn-cs"/>
+              </a:defRPr>
+            </a:lvl4pPr>
+            <a:lvl5pPr marL="2057400" indent="-228600" algn="l" defTabSz="457200" rtl="0" eaLnBrk="1" latinLnBrk="0" hangingPunct="1">
+              <a:spcBef>
+                <a:spcPct val="20000"/>
+              </a:spcBef>
+              <a:buFont typeface="Arial"/>
+              <a:buChar char="»"/>
+              <a:defRPr sz="2000" kern="1200">
+                <a:solidFill>
+                  <a:schemeClr val="tx1"/>
+                </a:solidFill>
+                <a:latin typeface="+mn-lt"/>
+                <a:ea typeface="+mn-ea"/>
+                <a:cs typeface="+mn-cs"/>
+              </a:defRPr>
+            </a:lvl5pPr>
+            <a:lvl6pPr marL="2514600" indent="-228600" algn="l" defTabSz="457200" rtl="0" eaLnBrk="1" latinLnBrk="0" hangingPunct="1">
+              <a:spcBef>
+                <a:spcPct val="20000"/>
+              </a:spcBef>
+              <a:buFont typeface="Arial"/>
+              <a:buChar char="•"/>
+              <a:defRPr sz="2000" kern="1200">
+                <a:solidFill>
+                  <a:schemeClr val="tx1"/>
+                </a:solidFill>
+                <a:latin typeface="+mn-lt"/>
+                <a:ea typeface="+mn-ea"/>
+                <a:cs typeface="+mn-cs"/>
+              </a:defRPr>
+            </a:lvl6pPr>
+            <a:lvl7pPr marL="2971800" indent="-228600" algn="l" defTabSz="457200" rtl="0" eaLnBrk="1" latinLnBrk="0" hangingPunct="1">
+              <a:spcBef>
+                <a:spcPct val="20000"/>
+              </a:spcBef>
+              <a:buFont typeface="Arial"/>
+              <a:buChar char="•"/>
+              <a:defRPr sz="2000" kern="1200">
+                <a:solidFill>
+                  <a:schemeClr val="tx1"/>
+                </a:solidFill>
+                <a:latin typeface="+mn-lt"/>
+                <a:ea typeface="+mn-ea"/>
+                <a:cs typeface="+mn-cs"/>
+              </a:defRPr>
+            </a:lvl7pPr>
+            <a:lvl8pPr marL="3429000" indent="-228600" algn="l" defTabSz="457200" rtl="0" eaLnBrk="1" latinLnBrk="0" hangingPunct="1">
+              <a:spcBef>
+                <a:spcPct val="20000"/>
+              </a:spcBef>
+              <a:buFont typeface="Arial"/>
+              <a:buChar char="•"/>
+              <a:defRPr sz="2000" kern="1200">
+                <a:solidFill>
+                  <a:schemeClr val="tx1"/>
+                </a:solidFill>
+                <a:latin typeface="+mn-lt"/>
+                <a:ea typeface="+mn-ea"/>
+                <a:cs typeface="+mn-cs"/>
+              </a:defRPr>
+            </a:lvl8pPr>
+            <a:lvl9pPr marL="3886200" indent="-228600" algn="l" defTabSz="457200" rtl="0" eaLnBrk="1" latinLnBrk="0" hangingPunct="1">
+              <a:spcBef>
+                <a:spcPct val="20000"/>
+              </a:spcBef>
+              <a:buFont typeface="Arial"/>
+              <a:buChar char="•"/>
+              <a:defRPr sz="2000" kern="1200">
+                <a:solidFill>
+                  <a:schemeClr val="tx1"/>
+                </a:solidFill>
+                <a:latin typeface="+mn-lt"/>
+                <a:ea typeface="+mn-ea"/>
+                <a:cs typeface="+mn-cs"/>
+              </a:defRPr>
+            </a:lvl9pPr>
+          </a:lstStyle>
+          <a:p>
+            <a:endParaRPr lang="en-US" dirty="0"/>
+          </a:p>
+          <a:p>
+            <a:r>
+              <a:rPr lang="en-US" dirty="0" err="1" smtClean="0"/>
+              <a:t>Jupyter</a:t>
+            </a:r>
+            <a:r>
+              <a:rPr lang="en-US" dirty="0" smtClean="0"/>
+              <a:t> provides </a:t>
+            </a:r>
+            <a:r>
+              <a:rPr lang="en-US" dirty="0"/>
+              <a:t>a rich architecture for interactive computing with:    </a:t>
+            </a:r>
+          </a:p>
+          <a:p>
+            <a:pPr lvl="1"/>
+            <a:r>
+              <a:rPr lang="en-US" dirty="0"/>
+              <a:t>Powerful interactive shells (terminal and </a:t>
+            </a:r>
+            <a:r>
+              <a:rPr lang="en-US" dirty="0" err="1"/>
+              <a:t>Qt</a:t>
+            </a:r>
+            <a:r>
+              <a:rPr lang="en-US" dirty="0"/>
+              <a:t>-based)</a:t>
+            </a:r>
+            <a:r>
+              <a:rPr lang="en-US" dirty="0" smtClean="0"/>
+              <a:t>.</a:t>
+            </a:r>
+          </a:p>
+          <a:p>
+            <a:pPr lvl="1"/>
+            <a:r>
+              <a:rPr lang="en-US" dirty="0" smtClean="0"/>
+              <a:t>A </a:t>
+            </a:r>
+            <a:r>
+              <a:rPr lang="en-US" b="1" dirty="0"/>
+              <a:t>browser-based notebook </a:t>
+            </a:r>
+            <a:r>
+              <a:rPr lang="en-US" dirty="0"/>
+              <a:t>with support for code, rich text, mathematical expressions, inline plots and other rich </a:t>
+            </a:r>
+            <a:r>
+              <a:rPr lang="en-US" dirty="0" smtClean="0"/>
+              <a:t>media.</a:t>
+            </a:r>
+          </a:p>
+          <a:p>
+            <a:pPr lvl="1"/>
+            <a:r>
+              <a:rPr lang="en-US" dirty="0" smtClean="0"/>
+              <a:t>Support </a:t>
+            </a:r>
+            <a:r>
+              <a:rPr lang="en-US" dirty="0"/>
+              <a:t>for interactive data visualization and use of GUI </a:t>
+            </a:r>
+            <a:r>
+              <a:rPr lang="en-US" dirty="0" smtClean="0"/>
+              <a:t>toolkits.</a:t>
+            </a:r>
+          </a:p>
+          <a:p>
+            <a:pPr lvl="1"/>
+            <a:r>
+              <a:rPr lang="en-US" dirty="0" smtClean="0"/>
+              <a:t>Flexible</a:t>
+            </a:r>
+            <a:r>
+              <a:rPr lang="en-US" dirty="0"/>
+              <a:t>, embeddable interpreters to load into your own </a:t>
+            </a:r>
+            <a:r>
+              <a:rPr lang="en-US" dirty="0" smtClean="0"/>
+              <a:t>projects.</a:t>
+            </a:r>
+          </a:p>
+          <a:p>
+            <a:pPr lvl="1"/>
+            <a:r>
+              <a:rPr lang="en-US" dirty="0" smtClean="0"/>
+              <a:t>Easy </a:t>
+            </a:r>
+            <a:r>
+              <a:rPr lang="en-US" dirty="0"/>
+              <a:t>to use, high performance tools for parallel computing.</a:t>
+            </a:r>
+          </a:p>
+        </p:txBody>
+      </p:sp>
+    </p:spTree>
+    <p:extLst>
+      <p:ext uri="{BB962C8B-B14F-4D97-AF65-F5344CB8AC3E}">
+        <p14:creationId xmlns:p14="http://schemas.microsoft.com/office/powerpoint/2010/main" val="2018473152"/>
+      </p:ext>
+    </p:extLst>
+  </p:cSld>
+  <p:clrMapOvr>
+    <a:masterClrMapping/>
+  </p:clrMapOvr>
+</p:sld>
+</file>
+
+<file path=ppt/slides/slide9.xml><?xml version="1.0" encoding="utf-8"?>
+<p:sld xmlns:a="http://schemas.openxmlformats.org/drawingml/2006/main" xmlns:r="http://schemas.openxmlformats.org/officeDocument/2006/relationships" xmlns:p="http://schemas.openxmlformats.org/presentationml/2006/main">
+  <p:cSld>
+    <p:spTree>
+      <p:nvGrpSpPr>
+        <p:cNvPr id="1" name=""/>
+        <p:cNvGrpSpPr/>
+        <p:nvPr/>
+      </p:nvGrpSpPr>
+      <p:grpSpPr>
+        <a:xfrm>
+          <a:off x="0" y="0"/>
+          <a:ext cx="0" cy="0"/>
+          <a:chOff x="0" y="0"/>
+          <a:chExt cx="0" cy="0"/>
+        </a:xfrm>
+      </p:grpSpPr>
+      <p:pic>
+        <p:nvPicPr>
+          <p:cNvPr id="3" name="Picture 2" descr="Screen Shot 2015-04-29 at 17.45.22.png"/>
+          <p:cNvPicPr>
+            <a:picLocks noChangeAspect="1"/>
+          </p:cNvPicPr>
+          <p:nvPr/>
+        </p:nvPicPr>
+        <p:blipFill>
+          <a:blip r:embed="rId2">
+            <a:extLst>
+              <a:ext uri="{28A0092B-C50C-407E-A947-70E740481C1C}">
+                <a14:useLocalDpi xmlns:a14="http://schemas.microsoft.com/office/drawing/2010/main" val="0"/>
+              </a:ext>
+            </a:extLst>
+          </a:blip>
+          <a:stretch>
+            <a:fillRect/>
+          </a:stretch>
+        </p:blipFill>
+        <p:spPr>
+          <a:xfrm>
+            <a:off x="1066800" y="0"/>
+            <a:ext cx="7001395" cy="6858000"/>
+          </a:xfrm>
+          <a:prstGeom prst="rect">
+            <a:avLst/>
+          </a:prstGeom>
+        </p:spPr>
+      </p:pic>
+      <p:cxnSp>
+        <p:nvCxnSpPr>
+          <p:cNvPr id="7" name="Straight Arrow Connector 6"/>
+          <p:cNvCxnSpPr/>
+          <p:nvPr/>
+        </p:nvCxnSpPr>
+        <p:spPr>
+          <a:xfrm flipH="1" flipV="1">
+            <a:off x="3225413" y="1534913"/>
+            <a:ext cx="4751317" cy="666956"/>
+          </a:xfrm>
+          <a:prstGeom prst="straightConnector1">
+            <a:avLst/>
+          </a:prstGeom>
+          <a:ln>
+            <a:tailEnd type="arrow"/>
+          </a:ln>
+        </p:spPr>
+        <p:style>
+          <a:lnRef idx="2">
+            <a:schemeClr val="accent1"/>
+          </a:lnRef>
+          <a:fillRef idx="0">
+            <a:schemeClr val="accent1"/>
+          </a:fillRef>
+          <a:effectRef idx="1">
+            <a:schemeClr val="accent1"/>
+          </a:effectRef>
+          <a:fontRef idx="minor">
+            <a:schemeClr val="tx1"/>
+          </a:fontRef>
+        </p:style>
+      </p:cxnSp>
+      <p:sp>
+        <p:nvSpPr>
+          <p:cNvPr id="9" name="TextBox 8"/>
+          <p:cNvSpPr txBox="1"/>
+          <p:nvPr/>
+        </p:nvSpPr>
+        <p:spPr>
+          <a:xfrm>
+            <a:off x="7142300" y="2201869"/>
+            <a:ext cx="1851789" cy="369332"/>
+          </a:xfrm>
+          <a:prstGeom prst="rect">
+            <a:avLst/>
+          </a:prstGeom>
+          <a:noFill/>
+        </p:spPr>
+        <p:txBody>
+          <a:bodyPr wrap="none" rtlCol="0">
+            <a:spAutoFit/>
+          </a:bodyPr>
+          <a:lstStyle/>
+          <a:p>
+            <a:r>
+              <a:rPr lang="en-US" dirty="0" smtClean="0"/>
+              <a:t>Run selected cells</a:t>
+            </a:r>
+            <a:endParaRPr lang="en-US" dirty="0"/>
+          </a:p>
+        </p:txBody>
+      </p:sp>
+    </p:spTree>
+    <p:extLst>
+      <p:ext uri="{BB962C8B-B14F-4D97-AF65-F5344CB8AC3E}">
+        <p14:creationId xmlns:p14="http://schemas.microsoft.com/office/powerpoint/2010/main" val="956557928"/>
+      </p:ext>
+    </p:extLst>
+  </p:cSld>
+  <p:clrMapOvr>
+    <a:masterClrMapping/>
+  </p:clrMapOvr>
+</p:sld>
+</file>
+
 <file path=ppt/theme/theme1.xml><?xml version="1.0" encoding="utf-8"?>
 <a:theme xmlns:a="http://schemas.openxmlformats.org/drawingml/2006/main" name="Office Theme">
   <a:themeElements>

</xml_diff>

<commit_message>
update presenters for this week training
</commit_message>
<xml_diff>
--- a/course_intro.pptx
+++ b/course_intro.pptx
@@ -204,7 +204,7 @@
           <a:p>
             <a:fld id="{4904B9C1-6A3D-4C13-A01D-A515624776C7}" type="datetimeFigureOut">
               <a:rPr lang="en-GB" smtClean="0"/>
-              <a:t>14/12/15</a:t>
+              <a:t>25/02/16</a:t>
             </a:fld>
             <a:endParaRPr lang="en-GB"/>
           </a:p>
@@ -1223,7 +1223,7 @@
             <a:fld id="{68EFDCB5-6D71-EB44-9F0A-D3622F5F58F7}" type="datetimeFigureOut">
               <a:rPr lang="en-US" smtClean="0"/>
               <a:pPr/>
-              <a:t>14/12/15</a:t>
+              <a:t>25/02/16</a:t>
             </a:fld>
             <a:endParaRPr lang="en-US"/>
           </a:p>
@@ -1395,7 +1395,7 @@
             <a:fld id="{68EFDCB5-6D71-EB44-9F0A-D3622F5F58F7}" type="datetimeFigureOut">
               <a:rPr lang="en-US" smtClean="0"/>
               <a:pPr/>
-              <a:t>14/12/15</a:t>
+              <a:t>25/02/16</a:t>
             </a:fld>
             <a:endParaRPr lang="en-US"/>
           </a:p>
@@ -1577,7 +1577,7 @@
             <a:fld id="{68EFDCB5-6D71-EB44-9F0A-D3622F5F58F7}" type="datetimeFigureOut">
               <a:rPr lang="en-US" smtClean="0"/>
               <a:pPr/>
-              <a:t>14/12/15</a:t>
+              <a:t>25/02/16</a:t>
             </a:fld>
             <a:endParaRPr lang="en-US"/>
           </a:p>
@@ -1749,7 +1749,7 @@
             <a:fld id="{68EFDCB5-6D71-EB44-9F0A-D3622F5F58F7}" type="datetimeFigureOut">
               <a:rPr lang="en-US" smtClean="0"/>
               <a:pPr/>
-              <a:t>14/12/15</a:t>
+              <a:t>25/02/16</a:t>
             </a:fld>
             <a:endParaRPr lang="en-US"/>
           </a:p>
@@ -1997,7 +1997,7 @@
             <a:fld id="{68EFDCB5-6D71-EB44-9F0A-D3622F5F58F7}" type="datetimeFigureOut">
               <a:rPr lang="en-US" smtClean="0"/>
               <a:pPr/>
-              <a:t>14/12/15</a:t>
+              <a:t>25/02/16</a:t>
             </a:fld>
             <a:endParaRPr lang="en-US"/>
           </a:p>
@@ -2287,7 +2287,7 @@
             <a:fld id="{68EFDCB5-6D71-EB44-9F0A-D3622F5F58F7}" type="datetimeFigureOut">
               <a:rPr lang="en-US" smtClean="0"/>
               <a:pPr/>
-              <a:t>14/12/15</a:t>
+              <a:t>25/02/16</a:t>
             </a:fld>
             <a:endParaRPr lang="en-US"/>
           </a:p>
@@ -2711,7 +2711,7 @@
             <a:fld id="{68EFDCB5-6D71-EB44-9F0A-D3622F5F58F7}" type="datetimeFigureOut">
               <a:rPr lang="en-US" smtClean="0"/>
               <a:pPr/>
-              <a:t>14/12/15</a:t>
+              <a:t>25/02/16</a:t>
             </a:fld>
             <a:endParaRPr lang="en-US"/>
           </a:p>
@@ -2831,7 +2831,7 @@
             <a:fld id="{68EFDCB5-6D71-EB44-9F0A-D3622F5F58F7}" type="datetimeFigureOut">
               <a:rPr lang="en-US" smtClean="0"/>
               <a:pPr/>
-              <a:t>14/12/15</a:t>
+              <a:t>25/02/16</a:t>
             </a:fld>
             <a:endParaRPr lang="en-US"/>
           </a:p>
@@ -2928,7 +2928,7 @@
             <a:fld id="{68EFDCB5-6D71-EB44-9F0A-D3622F5F58F7}" type="datetimeFigureOut">
               <a:rPr lang="en-US" smtClean="0"/>
               <a:pPr/>
-              <a:t>14/12/15</a:t>
+              <a:t>25/02/16</a:t>
             </a:fld>
             <a:endParaRPr lang="en-US"/>
           </a:p>
@@ -3207,7 +3207,7 @@
             <a:fld id="{68EFDCB5-6D71-EB44-9F0A-D3622F5F58F7}" type="datetimeFigureOut">
               <a:rPr lang="en-US" smtClean="0"/>
               <a:pPr/>
-              <a:t>14/12/15</a:t>
+              <a:t>25/02/16</a:t>
             </a:fld>
             <a:endParaRPr lang="en-US"/>
           </a:p>
@@ -3462,7 +3462,7 @@
             <a:fld id="{68EFDCB5-6D71-EB44-9F0A-D3622F5F58F7}" type="datetimeFigureOut">
               <a:rPr lang="en-US" smtClean="0"/>
               <a:pPr/>
-              <a:t>14/12/15</a:t>
+              <a:t>25/02/16</a:t>
             </a:fld>
             <a:endParaRPr lang="en-US"/>
           </a:p>
@@ -3677,7 +3677,7 @@
             <a:fld id="{68EFDCB5-6D71-EB44-9F0A-D3622F5F58F7}" type="datetimeFigureOut">
               <a:rPr lang="en-US" smtClean="0"/>
               <a:pPr/>
-              <a:t>14/12/15</a:t>
+              <a:t>25/02/16</a:t>
             </a:fld>
             <a:endParaRPr lang="en-US"/>
           </a:p>
@@ -4099,48 +4099,22 @@
           <a:lstStyle/>
           <a:p>
             <a:r>
-              <a:rPr lang="en-US" sz="2000" dirty="0" smtClean="0"/>
-              <a:t>Gordon Brown</a:t>
-            </a:r>
-            <a:r>
-              <a:rPr lang="en-US" sz="2000" dirty="0"/>
-              <a:t>, CRUK Cambridge </a:t>
-            </a:r>
-            <a:r>
-              <a:rPr lang="en-US" sz="2000" dirty="0" smtClean="0"/>
-              <a:t>Institute</a:t>
-            </a:r>
-          </a:p>
-          <a:p>
-            <a:r>
-              <a:rPr lang="en-US" sz="2000" dirty="0"/>
-              <a:t>Henry </a:t>
-            </a:r>
-            <a:r>
-              <a:rPr lang="en-US" sz="2000" dirty="0" err="1" smtClean="0"/>
-              <a:t>Farmery</a:t>
-            </a:r>
-            <a:r>
-              <a:rPr lang="en-US" sz="2000" dirty="0" smtClean="0"/>
-              <a:t>, </a:t>
-            </a:r>
-            <a:r>
-              <a:rPr lang="en-US" sz="2000" dirty="0"/>
-              <a:t>CRUK Cambridge Institute</a:t>
-            </a:r>
-            <a:endParaRPr lang="en-US" sz="2000" dirty="0" smtClean="0"/>
-          </a:p>
-          <a:p>
-            <a:r>
-              <a:rPr lang="en-US" sz="2000" dirty="0" smtClean="0"/>
+              <a:rPr lang="en-US" sz="2400" dirty="0" smtClean="0"/>
+              <a:t>Martin Hunt, Sanger Institute</a:t>
+            </a:r>
+            <a:endParaRPr lang="en-US" sz="2400" dirty="0" smtClean="0"/>
+          </a:p>
+          <a:p>
+            <a:r>
+              <a:rPr lang="en-US" sz="2400" dirty="0" smtClean="0"/>
               <a:t>Anne </a:t>
             </a:r>
             <a:r>
-              <a:rPr lang="en-US" sz="2000" dirty="0" err="1" smtClean="0"/>
+              <a:rPr lang="en-US" sz="2400" dirty="0" err="1" smtClean="0"/>
               <a:t>Pajon</a:t>
             </a:r>
             <a:r>
-              <a:rPr lang="en-US" sz="2000" dirty="0"/>
+              <a:rPr lang="en-US" sz="2400" dirty="0"/>
               <a:t>, CRUK Cambridge Institute</a:t>
             </a:r>
           </a:p>

</xml_diff>